<commit_message>
Fixing bugs in the presentation.
</commit_message>
<xml_diff>
--- a/test_report/ondex_graphdb_eval.pptx
+++ b/test_report/ondex_graphdb_eval.pptx
@@ -5677,7 +5677,7 @@
       </p:sp>
       <p:sp>
         <p:nvSpPr>
-          <p:cNvPr id="218" name="Proteins-&gt;Reactions-&gt;Pathways: // chain of paths, node selection via property (exploits indices) MATCH (prot:Protein) - [csby:consumed_by] -&gt; (:Reaction) - [:part_of] -&gt; (pway:Path{ title: ‘apoptosis’ }) // further conditions, but often not performant WHERE protein.name =~ ‘(?i)^DNA.+’ // Usual projection and post-selection operators RETURN prot.name, pway // Relations can have properties ORDER BY csby.pvalue LIMIT 1000"/>
+          <p:cNvPr id="218" name="Proteins-&gt;Reactions-&gt;Pathways: // chain of paths, node selection via property (exploits indices) MATCH (prot:Protein) - [csby:consumed_by] -&gt; (:Reaction) - [:part_of] -&gt; (pway:Path{ title: ‘apoptosis’ }) // further conditions, but often not performant WHERE prot.name =~ ‘(?i)^DNA.+’ // Usual projection and post-selection operators RETURN prot.name, pway // Relations can have properties ORDER BY csby.pvalue LIMIT 1000"/>
           <p:cNvSpPr txBox="1"/>
           <p:nvPr/>
         </p:nvSpPr>
@@ -5736,7 +5736,7 @@
             </a:r>
             <a:br/>
             <a:r>
-              <a:t>WHERE protein.name =~ ‘(?i)^DNA.+’</a:t>
+              <a:t>WHERE prot.name =~ ‘(?i)^DNA.+’</a:t>
             </a:r>
             <a:br/>
             <a:r>
@@ -7168,8 +7168,8 @@
         </p:nvGrpSpPr>
         <p:grpSpPr>
           <a:xfrm>
-            <a:off x="16430644" y="8581121"/>
-            <a:ext cx="7953357" cy="5134880"/>
+            <a:off x="16430645" y="8581121"/>
+            <a:ext cx="7953356" cy="5134879"/>
             <a:chOff x="0" y="0"/>
             <a:chExt cx="7953355" cy="5134878"/>
           </a:xfrm>
@@ -7258,8 +7258,8 @@
         </p:nvSpPr>
         <p:spPr>
           <a:xfrm>
-            <a:off x="6493694" y="960479"/>
-            <a:ext cx="18375507" cy="2101767"/>
+            <a:off x="6493693" y="960479"/>
+            <a:ext cx="18375508" cy="2101767"/>
           </a:xfrm>
           <a:prstGeom prst="rect">
             <a:avLst/>
@@ -7296,7 +7296,7 @@
       </p:sp>
       <p:sp>
         <p:nvSpPr>
-          <p:cNvPr id="247" name="// Branch 2 MATCH (prot:Protein), (enz:Enzyme), (tns:Transport) - [:part_of] -&gt; (path:Path) WHERE (    (enz) - [:ac_by|:in_by] -&gt; (:Comp) - [:pd_by|:cs_by] -&gt; (tns) // Branch 2.1     OR (tns) - [:ca_by] -&gt; (enz) ) // Branch 2.2    AND ( (prot) - [:is_a] -&gt; (enz) OR (prot) &lt;- [:ac_by] - (enz) ) RETURN prot, path LIMIT 30 UNION  // Branch1 MATCH (prot:Protein) - [:pd_by|:cs_by] -&gt; (:Reaction) - [:part_of] -&gt; (path:Path) RETURN prot, path LIMIT 30"/>
+          <p:cNvPr id="247" name="// Branch 2 MATCH (prot:Protein), (enz:Enzyme), (tns:Transport) - [:part_of] -&gt; (path:Path) WHERE (    (enz) - [:ac_by|:in_by] -&gt; (:Comp) - [:pd_by|:cs_by] -&gt; (tns) // Branch 2.1     OR (tns) - [:ca_by] -&gt; (enz) )                                                           //Branch 2.2 (pt1)            AND ( (prot) - [:is_a] -&gt; (enz) OR (prot) &lt;- [:ac_by] - (enz) ) // Branch 2.2 (pt2) RETURN prot, path LIMIT 30 UNION  // Branch1 MATCH (prot:Protein) - [:pd_by|:cs_by] -&gt; (:Reaction) - [:part_of] -&gt; (path:Path) RETURN prot, path LIMIT 30"/>
           <p:cNvSpPr txBox="1"/>
           <p:nvPr/>
         </p:nvSpPr>
@@ -7367,7 +7367,7 @@
             </a:r>
             <a:br/>
             <a:r>
-              <a:t>    OR (tns) - [:ca_by] -&gt; (enz) ) </a:t>
+              <a:t>    OR (tns) - [:ca_by] -&gt; (enz) )                                                           </a:t>
             </a:r>
             <a:r>
               <a:rPr>
@@ -7376,11 +7376,20 @@
                 <a:cs typeface="Avenir Heavy"/>
                 <a:sym typeface="Avenir Heavy"/>
               </a:rPr>
-              <a:t>// Branch 2.2</a:t>
+              <a:t>//Branch 2.2 (pt1)</a:t>
             </a:r>
             <a:br/>
             <a:r>
-              <a:t>   AND ( (prot) - [:is_a] -&gt; (enz) OR (prot) &lt;- [:ac_by] - (enz) )</a:t>
+              <a:t>           AND ( (prot) - [:is_a] -&gt; (enz) OR (prot) &lt;- [:ac_by] - (enz) ) </a:t>
+            </a:r>
+            <a:r>
+              <a:rPr>
+                <a:latin typeface="Avenir Heavy"/>
+                <a:ea typeface="Avenir Heavy"/>
+                <a:cs typeface="Avenir Heavy"/>
+                <a:sym typeface="Avenir Heavy"/>
+              </a:rPr>
+              <a:t>// Branch 2.2 (pt2)</a:t>
             </a:r>
             <a:br/>
             <a:r>
@@ -7682,7 +7691,7 @@
       </p:sp>
       <p:sp>
         <p:nvSpPr>
-          <p:cNvPr id="254" name="Basically, it’s relational-oriented, we might still be OK with metadata modelled the same way, however:…"/>
+          <p:cNvPr id="254" name="Basically, it’s relational-oriented about schemas…"/>
           <p:cNvSpPr txBox="1"/>
           <p:nvPr>
             <p:ph type="body" idx="4294967295"/>
@@ -7701,44 +7710,56 @@
           <a:bodyPr anchor="t"/>
           <a:lstStyle/>
           <a:p>
-            <a:pPr marL="515845" indent="-515845" defTabSz="624363">
+            <a:pPr marL="461546" indent="-461546" defTabSz="558641">
               <a:spcBef>
-                <a:spcPts val="4400"/>
+                <a:spcPts val="4000"/>
               </a:spcBef>
               <a:buClrTx/>
-              <a:defRPr sz="3952"/>
+              <a:defRPr sz="3536"/>
             </a:pPr>
             <a:r>
-              <a:t>Basically, it’s relational-oriented, we might still be OK with metadata modelled the same way, however:</a:t>
-            </a:r>
-          </a:p>
-          <a:p>
-            <a:pPr marL="515845" indent="-515845" defTabSz="624363">
+              <a:t>Basically, it’s relational-oriented about schemas</a:t>
+            </a:r>
+          </a:p>
+          <a:p>
+            <a:pPr marL="461546" indent="-461546" defTabSz="558641">
               <a:spcBef>
-                <a:spcPts val="4400"/>
+                <a:spcPts val="4000"/>
               </a:spcBef>
               <a:buClrTx/>
-              <a:defRPr sz="3952"/>
+              <a:defRPr sz="3536"/>
             </a:pPr>
             <a:r>
-              <a:t>MATCH (molecule:Molecule),</a:t>
-            </a:r>
-            <a:br/>
-            <a:r>
-              <a:t>    (molType:Class)-[:is_a*]-&gt;(:Class{ name:’Protein’ })</a:t>
-            </a:r>
-            <a:br/>
-            <a:r>
-              <a:t>WHERE LABELS molType IN LABELS (molecule)</a:t>
-            </a:r>
-          </a:p>
-          <a:p>
-            <a:pPr lvl="1" marL="872969" indent="-515845" defTabSz="624363">
+              <a:t>we might still be OK with metadata modelled as graphs, however:</a:t>
+            </a:r>
+          </a:p>
+          <a:p>
+            <a:pPr marL="461546" indent="-461546" defTabSz="558641">
               <a:spcBef>
-                <a:spcPts val="4400"/>
+                <a:spcPts val="4000"/>
               </a:spcBef>
               <a:buClrTx/>
-              <a:defRPr sz="3952">
+              <a:defRPr sz="3536"/>
+            </a:pPr>
+            <a:r>
+              <a:t>MATCH (molecule:Molecule),</a:t>
+            </a:r>
+            <a:br/>
+            <a:r>
+              <a:t>    (molType:Class)-[:is_a*]-&gt;(:Class{ name:’Protein’ })</a:t>
+            </a:r>
+            <a:br/>
+            <a:r>
+              <a:t>WHERE LABELS molType IN LABELS (molecule)</a:t>
+            </a:r>
+          </a:p>
+          <a:p>
+            <a:pPr lvl="1" marL="781078" indent="-461546" defTabSz="558641">
+              <a:spcBef>
+                <a:spcPts val="4000"/>
+              </a:spcBef>
+              <a:buClrTx/>
+              <a:defRPr sz="3536">
                 <a:latin typeface="Avenir Heavy"/>
                 <a:ea typeface="Avenir Heavy"/>
                 <a:cs typeface="Avenir Heavy"/>
@@ -7750,48 +7771,48 @@
             </a:r>
           </a:p>
           <a:p>
-            <a:pPr marL="515845" indent="-515845" defTabSz="624363">
+            <a:pPr marL="461546" indent="-461546" defTabSz="558641">
               <a:spcBef>
-                <a:spcPts val="4400"/>
+                <a:spcPts val="4000"/>
               </a:spcBef>
               <a:buClrTx/>
-              <a:defRPr sz="3952"/>
+              <a:defRPr sz="3536"/>
             </a:pPr>
             <a:r>
               <a:t>MATCH (molecule:Molecule:$additionalLabel) CREATE …</a:t>
             </a:r>
           </a:p>
           <a:p>
-            <a:pPr lvl="1" marL="872969" indent="-515845" defTabSz="624363">
+            <a:pPr lvl="1" marL="781078" indent="-461546" defTabSz="558641">
               <a:spcBef>
-                <a:spcPts val="4400"/>
+                <a:spcPts val="4000"/>
               </a:spcBef>
               <a:buClrTx/>
-              <a:defRPr sz="3952"/>
+              <a:defRPr sz="3536"/>
             </a:pPr>
             <a:r>
               <a:t>Parameterising on labels not possible</a:t>
             </a:r>
           </a:p>
           <a:p>
-            <a:pPr lvl="1" marL="872969" indent="-515845" defTabSz="624363">
+            <a:pPr lvl="1" marL="781078" indent="-461546" defTabSz="558641">
               <a:spcBef>
-                <a:spcPts val="4400"/>
+                <a:spcPts val="4000"/>
               </a:spcBef>
               <a:buClrTx/>
-              <a:defRPr sz="3952"/>
+              <a:defRPr sz="3536"/>
             </a:pPr>
             <a:r>
               <a:t>Requires non parametric Cypher string =&gt; UNWIND-based bulk loading impossible </a:t>
             </a:r>
           </a:p>
           <a:p>
-            <a:pPr lvl="2" marL="1230093" indent="-515845" defTabSz="624363">
+            <a:pPr lvl="2" marL="1100610" indent="-461546" defTabSz="558641">
               <a:spcBef>
-                <a:spcPts val="4400"/>
+                <a:spcPts val="4000"/>
               </a:spcBef>
               <a:buClrTx/>
-              <a:defRPr sz="3952">
+              <a:defRPr sz="3536">
                 <a:latin typeface="Avenir Heavy"/>
                 <a:ea typeface="Avenir Heavy"/>
                 <a:cs typeface="Avenir Heavy"/>
@@ -7803,12 +7824,12 @@
             </a:r>
           </a:p>
           <a:p>
-            <a:pPr lvl="1" marL="872969" indent="-515845" defTabSz="624363">
+            <a:pPr lvl="1" marL="781078" indent="-461546" defTabSz="558641">
               <a:spcBef>
-                <a:spcPts val="4400"/>
+                <a:spcPts val="4000"/>
               </a:spcBef>
               <a:buClrTx/>
-              <a:defRPr sz="3952"/>
+              <a:defRPr sz="3536"/>
             </a:pPr>
             <a:r>
               <a:t>Programmatic approach possible, but a lot of problems with things like Lucene version mismatches (one reason being that ONDEX would require review and proper plug-in architecture)</a:t>
@@ -9092,7 +9113,7 @@
       </p:sp>
       <p:sp>
         <p:nvSpPr>
-          <p:cNvPr id="274" name="Rich schema-based queries From: MATCH (molecule:Molecule), (molType:Class)-[:is_a*]-&gt;(:Class{ name:’Protein’ }) WHERE LABELS molType IN LABELS (molecule)  To: MATCH (mol:{Concept}) &lt;- [:conceptClass] - (cc:ConceptClass),   (cc) &lt;- [:specializationOf*] - (:ConceptClass{name:’Protein’}…"/>
+          <p:cNvPr id="274" name="Rich schema-based queries From: MATCH (molecule:Molecule), (molType:Class)-[:is_a*]-&gt;(:Class{ name:’Protein’ }) WHERE molType.label IN LABELS (molecule)  To: MATCH (mol:{Concept}) &lt;- [:conceptClass] - (cc:ConceptClass),   (cc) &lt;- [:specializationOf*] - (:ConceptClass{name:’Protein’}…"/>
           <p:cNvSpPr txBox="1"/>
           <p:nvPr/>
         </p:nvSpPr>
@@ -9154,7 +9175,7 @@
             </a:r>
             <a:br/>
             <a:r>
-              <a:t>WHERE LABELS molType IN LABELS (molecule)</a:t>
+              <a:t>WHERE molType.label IN LABELS (molecule)</a:t>
             </a:r>
             <a:br/>
             <a:br/>
@@ -10732,7 +10753,7 @@
                           <a:cs typeface="Helvetica Neue Bold Condensed"/>
                           <a:sym typeface="Helvetica Neue Bold Condensed"/>
                         </a:rPr>
-                        <a:t>+ Easier? +                        <a:t>+ Easier (eg, compact, omissions)?  - Expressivity for some patterns (unions, DML)</a:t>
                       </a:r>
                     </a:p>
@@ -10795,7 +10816,7 @@
                           <a:cs typeface="Helvetica Neue Bold Condensed"/>
                           <a:sym typeface="Helvetica Neue Bold Condensed"/>
                         </a:rPr>
-                        <a:t>- Harder? (URIs, namespaces) +                        <a:t>- Harder? (URIs, namespaces, verbosity)  + More expressive</a:t>
                       </a:r>
                     </a:p>

</xml_diff>

<commit_message>
Updating OndexServiceProvider_Notes.md and presentation.
</commit_message>
<xml_diff>
--- a/test_report/ondex_graphdb_eval.pptx
+++ b/test_report/ondex_graphdb_eval.pptx
@@ -1,6 +1,6 @@
 
 <file path=ppt/presentation.xml><?xml version="1.0" encoding="utf-8"?>
-<p:presentation xmlns:a="http://schemas.openxmlformats.org/drawingml/2006/main" xmlns:r="http://schemas.openxmlformats.org/officeDocument/2006/relationships" xmlns:p="http://schemas.openxmlformats.org/presentationml/2006/main">
+<p:presentation xmlns:a="http://schemas.openxmlformats.org/drawingml/2006/main" xmlns:r="http://schemas.openxmlformats.org/officeDocument/2006/relationships" xmlns:p="http://schemas.openxmlformats.org/presentationml/2006/main" xmlns:m="http://schemas.openxmlformats.org/officeDocument/2006/math" xmlns:a14="http://schemas.microsoft.com/office/drawing/2010/main">
   <p:sldMasterIdLst>
     <p:sldMasterId id="2147483648" r:id="rId5"/>
   </p:sldMasterIdLst>
@@ -351,11 +351,11 @@
 </file>
 
 <file path=ppt/commentAuthors.xml><?xml version="1.0" encoding="utf-8"?>
-<p:cmAuthorLst xmlns:a="http://schemas.openxmlformats.org/drawingml/2006/main" xmlns:r="http://schemas.openxmlformats.org/officeDocument/2006/relationships" xmlns:p="http://schemas.openxmlformats.org/presentationml/2006/main"/>
+<p:cmAuthorLst xmlns:a="http://schemas.openxmlformats.org/drawingml/2006/main" xmlns:r="http://schemas.openxmlformats.org/officeDocument/2006/relationships" xmlns:p="http://schemas.openxmlformats.org/presentationml/2006/main" xmlns:m="http://schemas.openxmlformats.org/officeDocument/2006/math" xmlns:a14="http://schemas.microsoft.com/office/drawing/2010/main"/>
 </file>
 
 <file path=ppt/notesMasters/notesMaster1.xml><?xml version="1.0" encoding="utf-8"?>
-<p:notesMaster xmlns:a="http://schemas.openxmlformats.org/drawingml/2006/main" xmlns:r="http://schemas.openxmlformats.org/officeDocument/2006/relationships" xmlns:p="http://schemas.openxmlformats.org/presentationml/2006/main">
+<p:notesMaster xmlns:a="http://schemas.openxmlformats.org/drawingml/2006/main" xmlns:r="http://schemas.openxmlformats.org/officeDocument/2006/relationships" xmlns:p="http://schemas.openxmlformats.org/presentationml/2006/main" xmlns:m="http://schemas.openxmlformats.org/officeDocument/2006/math" xmlns:a14="http://schemas.microsoft.com/office/drawing/2010/main">
   <p:cSld>
     <p:spTree>
       <p:nvGrpSpPr>
@@ -529,7 +529,7 @@
 </file>
 
 <file path=ppt/slideLayouts/slideLayout1.xml><?xml version="1.0" encoding="utf-8"?>
-<p:sldLayout xmlns:a="http://schemas.openxmlformats.org/drawingml/2006/main" xmlns:r="http://schemas.openxmlformats.org/officeDocument/2006/relationships" xmlns:p="http://schemas.openxmlformats.org/presentationml/2006/main" type="title" showMasterSp="1" showMasterPhAnim="1">
+<p:sldLayout xmlns:a="http://schemas.openxmlformats.org/drawingml/2006/main" xmlns:r="http://schemas.openxmlformats.org/officeDocument/2006/relationships" xmlns:p="http://schemas.openxmlformats.org/presentationml/2006/main" xmlns:m="http://schemas.openxmlformats.org/officeDocument/2006/math" xmlns:a14="http://schemas.microsoft.com/office/drawing/2010/main" type="title" showMasterSp="1" showMasterPhAnim="1">
   <p:cSld name="Title &amp; Subtitle">
     <p:bg>
       <p:bgPr>
@@ -785,7 +785,7 @@
 </file>
 
 <file path=ppt/slideLayouts/slideLayout10.xml><?xml version="1.0" encoding="utf-8"?>
-<p:sldLayout xmlns:a="http://schemas.openxmlformats.org/drawingml/2006/main" xmlns:r="http://schemas.openxmlformats.org/officeDocument/2006/relationships" xmlns:p="http://schemas.openxmlformats.org/presentationml/2006/main" type="tx" showMasterSp="1" showMasterPhAnim="1">
+<p:sldLayout xmlns:a="http://schemas.openxmlformats.org/drawingml/2006/main" xmlns:r="http://schemas.openxmlformats.org/officeDocument/2006/relationships" xmlns:p="http://schemas.openxmlformats.org/presentationml/2006/main" xmlns:m="http://schemas.openxmlformats.org/officeDocument/2006/math" xmlns:a14="http://schemas.microsoft.com/office/drawing/2010/main" type="tx" showMasterSp="1" showMasterPhAnim="1">
   <p:cSld name="Photo - 3 Up">
     <p:spTree>
       <p:nvGrpSpPr>
@@ -914,7 +914,7 @@
 </file>
 
 <file path=ppt/slideLayouts/slideLayout11.xml><?xml version="1.0" encoding="utf-8"?>
-<p:sldLayout xmlns:a="http://schemas.openxmlformats.org/drawingml/2006/main" xmlns:r="http://schemas.openxmlformats.org/officeDocument/2006/relationships" xmlns:p="http://schemas.openxmlformats.org/presentationml/2006/main" type="tx" showMasterSp="1" showMasterPhAnim="1">
+<p:sldLayout xmlns:a="http://schemas.openxmlformats.org/drawingml/2006/main" xmlns:r="http://schemas.openxmlformats.org/officeDocument/2006/relationships" xmlns:p="http://schemas.openxmlformats.org/presentationml/2006/main" xmlns:m="http://schemas.openxmlformats.org/officeDocument/2006/math" xmlns:a14="http://schemas.microsoft.com/office/drawing/2010/main" type="tx" showMasterSp="1" showMasterPhAnim="1">
   <p:cSld name="Quote">
     <p:spTree>
       <p:nvGrpSpPr>
@@ -1048,7 +1048,7 @@
 </file>
 
 <file path=ppt/slideLayouts/slideLayout12.xml><?xml version="1.0" encoding="utf-8"?>
-<p:sldLayout xmlns:a="http://schemas.openxmlformats.org/drawingml/2006/main" xmlns:r="http://schemas.openxmlformats.org/officeDocument/2006/relationships" xmlns:p="http://schemas.openxmlformats.org/presentationml/2006/main" type="tx" showMasterSp="1" showMasterPhAnim="1">
+<p:sldLayout xmlns:a="http://schemas.openxmlformats.org/drawingml/2006/main" xmlns:r="http://schemas.openxmlformats.org/officeDocument/2006/relationships" xmlns:p="http://schemas.openxmlformats.org/presentationml/2006/main" xmlns:m="http://schemas.openxmlformats.org/officeDocument/2006/math" xmlns:a14="http://schemas.microsoft.com/office/drawing/2010/main" type="tx" showMasterSp="1" showMasterPhAnim="1">
   <p:cSld name="Quote Photo">
     <p:bg>
       <p:bgPr>
@@ -1232,7 +1232,7 @@
 </file>
 
 <file path=ppt/slideLayouts/slideLayout13.xml><?xml version="1.0" encoding="utf-8"?>
-<p:sldLayout xmlns:a="http://schemas.openxmlformats.org/drawingml/2006/main" xmlns:r="http://schemas.openxmlformats.org/officeDocument/2006/relationships" xmlns:p="http://schemas.openxmlformats.org/presentationml/2006/main" type="tx" showMasterSp="1" showMasterPhAnim="1">
+<p:sldLayout xmlns:a="http://schemas.openxmlformats.org/drawingml/2006/main" xmlns:r="http://schemas.openxmlformats.org/officeDocument/2006/relationships" xmlns:p="http://schemas.openxmlformats.org/presentationml/2006/main" xmlns:m="http://schemas.openxmlformats.org/officeDocument/2006/math" xmlns:a14="http://schemas.microsoft.com/office/drawing/2010/main" type="tx" showMasterSp="1" showMasterPhAnim="1">
   <p:cSld name="Photo">
     <p:spTree>
       <p:nvGrpSpPr>
@@ -1307,7 +1307,7 @@
 </file>
 
 <file path=ppt/slideLayouts/slideLayout14.xml><?xml version="1.0" encoding="utf-8"?>
-<p:sldLayout xmlns:a="http://schemas.openxmlformats.org/drawingml/2006/main" xmlns:r="http://schemas.openxmlformats.org/officeDocument/2006/relationships" xmlns:p="http://schemas.openxmlformats.org/presentationml/2006/main" type="tx" showMasterSp="1" showMasterPhAnim="1">
+<p:sldLayout xmlns:a="http://schemas.openxmlformats.org/drawingml/2006/main" xmlns:r="http://schemas.openxmlformats.org/officeDocument/2006/relationships" xmlns:p="http://schemas.openxmlformats.org/presentationml/2006/main" xmlns:m="http://schemas.openxmlformats.org/officeDocument/2006/math" xmlns:a14="http://schemas.microsoft.com/office/drawing/2010/main" type="tx" showMasterSp="1" showMasterPhAnim="1">
   <p:cSld name="Blank">
     <p:spTree>
       <p:nvGrpSpPr>
@@ -1355,7 +1355,7 @@
 </file>
 
 <file path=ppt/slideLayouts/slideLayout2.xml><?xml version="1.0" encoding="utf-8"?>
-<p:sldLayout xmlns:a="http://schemas.openxmlformats.org/drawingml/2006/main" xmlns:r="http://schemas.openxmlformats.org/officeDocument/2006/relationships" xmlns:p="http://schemas.openxmlformats.org/presentationml/2006/main" type="tx" showMasterSp="1" showMasterPhAnim="1">
+<p:sldLayout xmlns:a="http://schemas.openxmlformats.org/drawingml/2006/main" xmlns:r="http://schemas.openxmlformats.org/officeDocument/2006/relationships" xmlns:p="http://schemas.openxmlformats.org/presentationml/2006/main" xmlns:m="http://schemas.openxmlformats.org/officeDocument/2006/math" xmlns:a14="http://schemas.microsoft.com/office/drawing/2010/main" type="tx" showMasterSp="1" showMasterPhAnim="1">
   <p:cSld name="Photo - Horizontal">
     <p:spTree>
       <p:nvGrpSpPr>
@@ -1585,7 +1585,7 @@
 </file>
 
 <file path=ppt/slideLayouts/slideLayout3.xml><?xml version="1.0" encoding="utf-8"?>
-<p:sldLayout xmlns:a="http://schemas.openxmlformats.org/drawingml/2006/main" xmlns:r="http://schemas.openxmlformats.org/officeDocument/2006/relationships" xmlns:p="http://schemas.openxmlformats.org/presentationml/2006/main" type="tx" showMasterSp="1" showMasterPhAnim="1">
+<p:sldLayout xmlns:a="http://schemas.openxmlformats.org/drawingml/2006/main" xmlns:r="http://schemas.openxmlformats.org/officeDocument/2006/relationships" xmlns:p="http://schemas.openxmlformats.org/presentationml/2006/main" xmlns:m="http://schemas.openxmlformats.org/officeDocument/2006/math" xmlns:a14="http://schemas.microsoft.com/office/drawing/2010/main" type="tx" showMasterSp="1" showMasterPhAnim="1">
   <p:cSld name="Photo - Horizontal Alt">
     <p:spTree>
       <p:nvGrpSpPr>
@@ -1815,7 +1815,7 @@
 </file>
 
 <file path=ppt/slideLayouts/slideLayout4.xml><?xml version="1.0" encoding="utf-8"?>
-<p:sldLayout xmlns:a="http://schemas.openxmlformats.org/drawingml/2006/main" xmlns:r="http://schemas.openxmlformats.org/officeDocument/2006/relationships" xmlns:p="http://schemas.openxmlformats.org/presentationml/2006/main" type="tx" showMasterSp="1" showMasterPhAnim="1">
+<p:sldLayout xmlns:a="http://schemas.openxmlformats.org/drawingml/2006/main" xmlns:r="http://schemas.openxmlformats.org/officeDocument/2006/relationships" xmlns:p="http://schemas.openxmlformats.org/presentationml/2006/main" xmlns:m="http://schemas.openxmlformats.org/officeDocument/2006/math" xmlns:a14="http://schemas.microsoft.com/office/drawing/2010/main" type="tx" showMasterSp="1" showMasterPhAnim="1">
   <p:cSld name="Title - Center">
     <p:spTree>
       <p:nvGrpSpPr>
@@ -1895,7 +1895,7 @@
 </file>
 
 <file path=ppt/slideLayouts/slideLayout5.xml><?xml version="1.0" encoding="utf-8"?>
-<p:sldLayout xmlns:a="http://schemas.openxmlformats.org/drawingml/2006/main" xmlns:r="http://schemas.openxmlformats.org/officeDocument/2006/relationships" xmlns:p="http://schemas.openxmlformats.org/presentationml/2006/main" type="tx" showMasterSp="1" showMasterPhAnim="1">
+<p:sldLayout xmlns:a="http://schemas.openxmlformats.org/drawingml/2006/main" xmlns:r="http://schemas.openxmlformats.org/officeDocument/2006/relationships" xmlns:p="http://schemas.openxmlformats.org/presentationml/2006/main" xmlns:m="http://schemas.openxmlformats.org/officeDocument/2006/math" xmlns:a14="http://schemas.microsoft.com/office/drawing/2010/main" type="tx" showMasterSp="1" showMasterPhAnim="1">
   <p:cSld name="Photo - Vertical">
     <p:bg>
       <p:bgPr>
@@ -2174,7 +2174,7 @@
 </file>
 
 <file path=ppt/slideLayouts/slideLayout6.xml><?xml version="1.0" encoding="utf-8"?>
-<p:sldLayout xmlns:a="http://schemas.openxmlformats.org/drawingml/2006/main" xmlns:r="http://schemas.openxmlformats.org/officeDocument/2006/relationships" xmlns:p="http://schemas.openxmlformats.org/presentationml/2006/main" type="tx" showMasterSp="1" showMasterPhAnim="1">
+<p:sldLayout xmlns:a="http://schemas.openxmlformats.org/drawingml/2006/main" xmlns:r="http://schemas.openxmlformats.org/officeDocument/2006/relationships" xmlns:p="http://schemas.openxmlformats.org/presentationml/2006/main" xmlns:m="http://schemas.openxmlformats.org/officeDocument/2006/math" xmlns:a14="http://schemas.microsoft.com/office/drawing/2010/main" type="tx" showMasterSp="1" showMasterPhAnim="1">
   <p:cSld name="Title - Top">
     <p:spTree>
       <p:nvGrpSpPr>
@@ -2246,7 +2246,7 @@
 </file>
 
 <file path=ppt/slideLayouts/slideLayout7.xml><?xml version="1.0" encoding="utf-8"?>
-<p:sldLayout xmlns:a="http://schemas.openxmlformats.org/drawingml/2006/main" xmlns:r="http://schemas.openxmlformats.org/officeDocument/2006/relationships" xmlns:p="http://schemas.openxmlformats.org/presentationml/2006/main" type="tx" showMasterSp="1" showMasterPhAnim="1">
+<p:sldLayout xmlns:a="http://schemas.openxmlformats.org/drawingml/2006/main" xmlns:r="http://schemas.openxmlformats.org/officeDocument/2006/relationships" xmlns:p="http://schemas.openxmlformats.org/presentationml/2006/main" xmlns:m="http://schemas.openxmlformats.org/officeDocument/2006/math" xmlns:a14="http://schemas.microsoft.com/office/drawing/2010/main" type="tx" showMasterSp="1" showMasterPhAnim="1">
   <p:cSld name="Title &amp; Bullets">
     <p:bg>
       <p:bgPr>
@@ -2389,7 +2389,7 @@
 </file>
 
 <file path=ppt/slideLayouts/slideLayout8.xml><?xml version="1.0" encoding="utf-8"?>
-<p:sldLayout xmlns:a="http://schemas.openxmlformats.org/drawingml/2006/main" xmlns:r="http://schemas.openxmlformats.org/officeDocument/2006/relationships" xmlns:p="http://schemas.openxmlformats.org/presentationml/2006/main" type="tx" showMasterSp="1" showMasterPhAnim="1">
+<p:sldLayout xmlns:a="http://schemas.openxmlformats.org/drawingml/2006/main" xmlns:r="http://schemas.openxmlformats.org/officeDocument/2006/relationships" xmlns:p="http://schemas.openxmlformats.org/presentationml/2006/main" xmlns:m="http://schemas.openxmlformats.org/officeDocument/2006/math" xmlns:a14="http://schemas.microsoft.com/office/drawing/2010/main" type="tx" showMasterSp="1" showMasterPhAnim="1">
   <p:cSld name="Title, Bullets &amp; Photo">
     <p:bg>
       <p:bgPr>
@@ -2598,7 +2598,7 @@
 </file>
 
 <file path=ppt/slideLayouts/slideLayout9.xml><?xml version="1.0" encoding="utf-8"?>
-<p:sldLayout xmlns:a="http://schemas.openxmlformats.org/drawingml/2006/main" xmlns:r="http://schemas.openxmlformats.org/officeDocument/2006/relationships" xmlns:p="http://schemas.openxmlformats.org/presentationml/2006/main" type="tx" showMasterSp="1" showMasterPhAnim="1">
+<p:sldLayout xmlns:a="http://schemas.openxmlformats.org/drawingml/2006/main" xmlns:r="http://schemas.openxmlformats.org/officeDocument/2006/relationships" xmlns:p="http://schemas.openxmlformats.org/presentationml/2006/main" xmlns:m="http://schemas.openxmlformats.org/officeDocument/2006/math" xmlns:a14="http://schemas.microsoft.com/office/drawing/2010/main" type="tx" showMasterSp="1" showMasterPhAnim="1">
   <p:cSld name="Bullets">
     <p:bg>
       <p:bgPr>
@@ -2721,7 +2721,7 @@
 </file>
 
 <file path=ppt/slideMasters/slideMaster1.xml><?xml version="1.0" encoding="utf-8"?>
-<p:sldMaster xmlns:a="http://schemas.openxmlformats.org/drawingml/2006/main" xmlns:r="http://schemas.openxmlformats.org/officeDocument/2006/relationships" xmlns:p="http://schemas.openxmlformats.org/presentationml/2006/main">
+<p:sldMaster xmlns:a="http://schemas.openxmlformats.org/drawingml/2006/main" xmlns:r="http://schemas.openxmlformats.org/officeDocument/2006/relationships" xmlns:p="http://schemas.openxmlformats.org/presentationml/2006/main" xmlns:m="http://schemas.openxmlformats.org/officeDocument/2006/math" xmlns:a14="http://schemas.microsoft.com/office/drawing/2010/main">
   <p:cSld>
     <p:bg>
       <p:bgPr>
@@ -3712,7 +3712,7 @@
 </file>
 
 <file path=ppt/slides/slide1.xml><?xml version="1.0" encoding="utf-8"?>
-<p:sld xmlns:a="http://schemas.openxmlformats.org/drawingml/2006/main" xmlns:r="http://schemas.openxmlformats.org/officeDocument/2006/relationships" xmlns:p="http://schemas.openxmlformats.org/presentationml/2006/main" showMasterSp="1" showMasterPhAnim="1">
+<p:sld xmlns:a="http://schemas.openxmlformats.org/drawingml/2006/main" xmlns:r="http://schemas.openxmlformats.org/officeDocument/2006/relationships" xmlns:p="http://schemas.openxmlformats.org/presentationml/2006/main" xmlns:m="http://schemas.openxmlformats.org/officeDocument/2006/math" xmlns:a14="http://schemas.microsoft.com/office/drawing/2010/main" showMasterSp="1" showMasterPhAnim="1">
   <p:cSld>
     <p:spTree>
       <p:nvGrpSpPr>
@@ -3786,7 +3786,7 @@
 </file>
 
 <file path=ppt/slides/slide10.xml><?xml version="1.0" encoding="utf-8"?>
-<p:sld xmlns:a="http://schemas.openxmlformats.org/drawingml/2006/main" xmlns:r="http://schemas.openxmlformats.org/officeDocument/2006/relationships" xmlns:p="http://schemas.openxmlformats.org/presentationml/2006/main" showMasterSp="1" showMasterPhAnim="1">
+<p:sld xmlns:a="http://schemas.openxmlformats.org/drawingml/2006/main" xmlns:r="http://schemas.openxmlformats.org/officeDocument/2006/relationships" xmlns:p="http://schemas.openxmlformats.org/presentationml/2006/main" xmlns:m="http://schemas.openxmlformats.org/officeDocument/2006/math" xmlns:a14="http://schemas.microsoft.com/office/drawing/2010/main" showMasterSp="1" showMasterPhAnim="1">
   <p:cSld>
     <p:spTree>
       <p:nvGrpSpPr>
@@ -3804,7 +3804,7 @@
       </p:grpSpPr>
       <p:sp>
         <p:nvSpPr>
-          <p:cNvPr id="176" name="Example QuerieS"/>
+          <p:cNvPr id="175" name="Example QuerieS"/>
           <p:cNvSpPr txBox="1"/>
           <p:nvPr>
             <p:ph type="title"/>
@@ -3832,7 +3832,7 @@
       </p:sp>
       <p:sp>
         <p:nvSpPr>
-          <p:cNvPr id="177" name="Count concepts (classes) in Trait Ontology: select count (distinct ?c) WHERE {     ?c a odxcc:TO_TERM. }"/>
+          <p:cNvPr id="176" name="Count concepts (classes) in Trait Ontology: select count (distinct ?c) WHERE {     ?c a odxcc:TO_TERM. }"/>
           <p:cNvSpPr txBox="1"/>
           <p:nvPr/>
         </p:nvSpPr>
@@ -3894,7 +3894,7 @@
       </p:sp>
       <p:sp>
         <p:nvSpPr>
-          <p:cNvPr id="178" name="Parts of membrane (transitively): select distinct ?csup ?supName ?c ?name  WHERE {   ?csup odx:conceptName ?supName.   FILTER ( ?supName = &quot;cellular membrane&quot; )…"/>
+          <p:cNvPr id="177" name="Parts of membrane (transitively): select distinct ?csup ?supName ?c ?name  WHERE {   ?csup odx:conceptName ?supName.   FILTER ( ?supName = &quot;cellular membrane&quot; )…"/>
           <p:cNvSpPr txBox="1"/>
           <p:nvPr/>
         </p:nvSpPr>
@@ -3983,7 +3983,7 @@
       </p:sp>
       <p:sp>
         <p:nvSpPr>
-          <p:cNvPr id="179" name="Proteins related to pathways: select distinct ?prot ?pway {    ?prot odxrt:pd_by|odxrt:cs_by ?react;              a odxcc:Protein.      ?react a odxcc:Reaction.…"/>
+          <p:cNvPr id="178" name="Proteins related to pathways: select distinct ?prot ?pway {    ?prot odxrt:pd_by|odxrt:cs_by ?react;              a odxcc:Protein.      ?react a odxcc:Reaction.…"/>
           <p:cNvSpPr txBox="1"/>
           <p:nvPr/>
         </p:nvSpPr>
@@ -4079,7 +4079,7 @@
       </p:sp>
       <p:sp>
         <p:nvSpPr>
-          <p:cNvPr id="180" name="optimised order"/>
+          <p:cNvPr id="179" name="optimised order"/>
           <p:cNvSpPr txBox="1"/>
           <p:nvPr/>
         </p:nvSpPr>
@@ -4127,7 +4127,7 @@
       </p:sp>
       <p:sp>
         <p:nvSpPr>
-          <p:cNvPr id="181" name="‘|’ for property paths"/>
+          <p:cNvPr id="180" name="‘|’ for property paths"/>
           <p:cNvSpPr txBox="1"/>
           <p:nvPr/>
         </p:nvSpPr>
@@ -4183,7 +4183,7 @@
 </file>
 
 <file path=ppt/slides/slide11.xml><?xml version="1.0" encoding="utf-8"?>
-<p:sld xmlns:a="http://schemas.openxmlformats.org/drawingml/2006/main" xmlns:r="http://schemas.openxmlformats.org/officeDocument/2006/relationships" xmlns:p="http://schemas.openxmlformats.org/presentationml/2006/main" showMasterSp="1" showMasterPhAnim="1">
+<p:sld xmlns:a="http://schemas.openxmlformats.org/drawingml/2006/main" xmlns:r="http://schemas.openxmlformats.org/officeDocument/2006/relationships" xmlns:p="http://schemas.openxmlformats.org/presentationml/2006/main" xmlns:m="http://schemas.openxmlformats.org/officeDocument/2006/math" xmlns:a14="http://schemas.microsoft.com/office/drawing/2010/main" showMasterSp="1" showMasterPhAnim="1">
   <p:cSld>
     <p:spTree>
       <p:nvGrpSpPr>
@@ -4201,7 +4201,7 @@
       </p:grpSpPr>
       <p:sp>
         <p:nvSpPr>
-          <p:cNvPr id="183" name="Example QuerieS"/>
+          <p:cNvPr id="182" name="Example QuerieS"/>
           <p:cNvSpPr txBox="1"/>
           <p:nvPr>
             <p:ph type="title"/>
@@ -4229,14 +4229,14 @@
       </p:sp>
       <p:sp>
         <p:nvSpPr>
-          <p:cNvPr id="184" name="# part 2   union {     # Branch 2    ?prot ^odxrt:ac_by|odxrt:is_a ?enz.    ?prot a odxcc:Protein.      ?enz a odxcc:Enzyme.     {          # Branch 2.1        ?enz odxrt:ac_by|odxrt:in_by ?comp.        ?comp a odxcc:Compound.          ?comp odxrt:cs_by|odxrt:pd_by ?trns        ?trns a odxcc:Transport      }       union {        # Branch 2.2        ?enz ^odxrt:ca_by ?trns.        ?comp a odxcc:Compound.         ?trns a odxcc:Transport      }      ?trns odxrt:part_of ?pway.   ?pway a odxcc:Path.   } }  LIMIT 1000"/>
+          <p:cNvPr id="183" name="# part 2   union {     # Branch 2    ?prot ^odxrt:ac_by|odxrt:is_a ?enz.    ?prot a odxcc:Protein.      ?enz a odxcc:Enzyme.     {          # Branch 2.1        ?enz odxrt:ac_by|odxrt:in_by ?comp.        ?comp a odxcc:Compound.          ?comp odxrt:cs_by|odxrt:pd_by ?trns        ?trns a odxcc:Transport      }       union {        # Branch 2.2        ?enz ^odxrt:ca_by ?trns.        ?trns a odxcc:Transport      }      ?trns odxrt:part_of ?pway.   ?pway a odxcc:Path.   } }  LIMIT 1000"/>
           <p:cNvSpPr txBox="1"/>
           <p:nvPr/>
         </p:nvSpPr>
         <p:spPr>
           <a:xfrm>
-            <a:off x="8200948" y="3154071"/>
-            <a:ext cx="5695316" cy="10201276"/>
+            <a:off x="8200948" y="3363621"/>
+            <a:ext cx="5695316" cy="9782176"/>
           </a:xfrm>
           <a:prstGeom prst="rect">
             <a:avLst/>
@@ -4367,10 +4367,6 @@
             </a:r>
             <a:br/>
             <a:r>
-              <a:t>       ?comp a odxcc:Compound. </a:t>
-            </a:r>
-            <a:br/>
-            <a:r>
               <a:t>       ?trns a odxcc:Transport</a:t>
             </a:r>
             <a:br/>
@@ -4398,7 +4394,7 @@
       </p:sp>
       <p:sp>
         <p:nvSpPr>
-          <p:cNvPr id="185" name="prefix odx: &lt;http://ondex.sourceforge.net/ondex-core#&gt; prefix odxcc: &lt;http://www.ondex.org/ex/conceptClass/&gt; prefix odxc: &lt;http://www.ondex.org/ex/concept/&gt; prefix odxrt: &lt;http://www.ondex.org/ex/relationType/&gt; prefix odxr: &lt;http://www.ondex.org/ex/relation/&gt; prefix rdfs: &lt;http://www.w3.org/2000/01/rdf-schema#&gt;…"/>
+          <p:cNvPr id="184" name="prefix odx: &lt;http://ondex.sourceforge.net/ondex-core#&gt; prefix odxcc: &lt;http://www.ondex.org/ex/conceptClass/&gt; prefix odxc: &lt;http://www.ondex.org/ex/concept/&gt; prefix odxrt: &lt;http://www.ondex.org/ex/relationType/&gt; prefix odxr: &lt;http://www.ondex.org/ex/relation/&gt; prefix rdfs: &lt;http://www.w3.org/2000/01/rdf-schema#&gt;…"/>
           <p:cNvSpPr txBox="1"/>
           <p:nvPr/>
         </p:nvSpPr>
@@ -4522,7 +4518,7 @@
       </p:sp>
       <p:sp>
         <p:nvSpPr>
-          <p:cNvPr id="186" name="Proteins related to pathways:"/>
+          <p:cNvPr id="185" name="Proteins related to pathways:"/>
           <p:cNvSpPr txBox="1"/>
           <p:nvPr/>
         </p:nvSpPr>
@@ -4583,7 +4579,7 @@
       </p:sp>
       <p:grpSp>
         <p:nvGrpSpPr>
-          <p:cNvPr id="189" name="Group"/>
+          <p:cNvPr id="188" name="Group"/>
           <p:cNvGrpSpPr/>
           <p:nvPr/>
         </p:nvGrpSpPr>
@@ -4597,7 +4593,7 @@
         </p:grpSpPr>
         <p:sp>
           <p:nvSpPr>
-            <p:cNvPr id="187" name="Rounded Rectangle"/>
+            <p:cNvPr id="186" name="Rounded Rectangle"/>
             <p:cNvSpPr/>
             <p:nvPr/>
           </p:nvSpPr>
@@ -4639,7 +4635,7 @@
         </p:sp>
         <p:pic>
           <p:nvPicPr>
-            <p:cNvPr id="188" name="ara_knet_pattern.png" descr="ara_knet_pattern.png"/>
+            <p:cNvPr id="187" name="ara_knet_pattern.png" descr="ara_knet_pattern.png"/>
             <p:cNvPicPr>
               <a:picLocks noChangeAspect="1"/>
             </p:cNvPicPr>
@@ -4679,7 +4675,7 @@
 </file>
 
 <file path=ppt/slides/slide12.xml><?xml version="1.0" encoding="utf-8"?>
-<p:sld xmlns:a="http://schemas.openxmlformats.org/drawingml/2006/main" xmlns:r="http://schemas.openxmlformats.org/officeDocument/2006/relationships" xmlns:p="http://schemas.openxmlformats.org/presentationml/2006/main" showMasterSp="1" showMasterPhAnim="1">
+<p:sld xmlns:a="http://schemas.openxmlformats.org/drawingml/2006/main" xmlns:r="http://schemas.openxmlformats.org/officeDocument/2006/relationships" xmlns:p="http://schemas.openxmlformats.org/presentationml/2006/main" xmlns:m="http://schemas.openxmlformats.org/officeDocument/2006/math" xmlns:a14="http://schemas.microsoft.com/office/drawing/2010/main" showMasterSp="1" showMasterPhAnim="1">
   <p:cSld>
     <p:spTree>
       <p:nvGrpSpPr>
@@ -4697,7 +4693,7 @@
       </p:grpSpPr>
       <p:sp>
         <p:nvSpPr>
-          <p:cNvPr id="191" name="RDF PerformancE"/>
+          <p:cNvPr id="190" name="RDF PerformancE"/>
           <p:cNvSpPr txBox="1"/>
           <p:nvPr>
             <p:ph type="title"/>
@@ -4721,7 +4717,7 @@
       </p:sp>
       <p:pic>
         <p:nvPicPr>
-          <p:cNvPr id="192" name="Image" descr="Image"/>
+          <p:cNvPr id="191" name="Image" descr="Image"/>
           <p:cNvPicPr>
             <a:picLocks noChangeAspect="1"/>
           </p:cNvPicPr>
@@ -4750,7 +4746,7 @@
       </p:pic>
       <p:sp>
         <p:nvSpPr>
-          <p:cNvPr id="193" name="Simple, common queries (Fuseki)"/>
+          <p:cNvPr id="192" name="Simple, common queries (Fuseki)"/>
           <p:cNvSpPr txBox="1"/>
           <p:nvPr/>
         </p:nvSpPr>
@@ -4794,7 +4790,7 @@
 </file>
 
 <file path=ppt/slides/slide13.xml><?xml version="1.0" encoding="utf-8"?>
-<p:sld xmlns:a="http://schemas.openxmlformats.org/drawingml/2006/main" xmlns:r="http://schemas.openxmlformats.org/officeDocument/2006/relationships" xmlns:p="http://schemas.openxmlformats.org/presentationml/2006/main" showMasterSp="1" showMasterPhAnim="1">
+<p:sld xmlns:a="http://schemas.openxmlformats.org/drawingml/2006/main" xmlns:r="http://schemas.openxmlformats.org/officeDocument/2006/relationships" xmlns:p="http://schemas.openxmlformats.org/presentationml/2006/main" xmlns:m="http://schemas.openxmlformats.org/officeDocument/2006/math" xmlns:a14="http://schemas.microsoft.com/office/drawing/2010/main" showMasterSp="1" showMasterPhAnim="1">
   <p:cSld>
     <p:spTree>
       <p:nvGrpSpPr>
@@ -4812,7 +4808,7 @@
       </p:grpSpPr>
       <p:sp>
         <p:nvSpPr>
-          <p:cNvPr id="195" name="RDF PerformancE"/>
+          <p:cNvPr id="194" name="RDF PerformancE"/>
           <p:cNvSpPr txBox="1"/>
           <p:nvPr>
             <p:ph type="title"/>
@@ -4840,7 +4836,7 @@
       </p:sp>
       <p:sp>
         <p:nvSpPr>
-          <p:cNvPr id="196" name="Queries over ONDEX paths (Fuseki)"/>
+          <p:cNvPr id="195" name="Queries over ONDEX paths (Fuseki)"/>
           <p:cNvSpPr txBox="1"/>
           <p:nvPr/>
         </p:nvSpPr>
@@ -4876,7 +4872,7 @@
       </p:sp>
       <p:pic>
         <p:nvPicPr>
-          <p:cNvPr id="197" name="Image" descr="Image"/>
+          <p:cNvPr id="196" name="Image" descr="Image"/>
           <p:cNvPicPr>
             <a:picLocks noChangeAspect="1"/>
           </p:cNvPicPr>
@@ -4913,7 +4909,7 @@
 </file>
 
 <file path=ppt/slides/slide14.xml><?xml version="1.0" encoding="utf-8"?>
-<p:sld xmlns:a="http://schemas.openxmlformats.org/drawingml/2006/main" xmlns:r="http://schemas.openxmlformats.org/officeDocument/2006/relationships" xmlns:p="http://schemas.openxmlformats.org/presentationml/2006/main" showMasterSp="1" showMasterPhAnim="1">
+<p:sld xmlns:a="http://schemas.openxmlformats.org/drawingml/2006/main" xmlns:r="http://schemas.openxmlformats.org/officeDocument/2006/relationships" xmlns:p="http://schemas.openxmlformats.org/presentationml/2006/main" xmlns:m="http://schemas.openxmlformats.org/officeDocument/2006/math" xmlns:a14="http://schemas.microsoft.com/office/drawing/2010/main" showMasterSp="1" showMasterPhAnim="1">
   <p:cSld>
     <p:spTree>
       <p:nvGrpSpPr>
@@ -4931,7 +4927,7 @@
       </p:grpSpPr>
       <p:sp>
         <p:nvSpPr>
-          <p:cNvPr id="199" name="RDF PerformancE"/>
+          <p:cNvPr id="198" name="RDF PerformancE"/>
           <p:cNvSpPr txBox="1"/>
           <p:nvPr>
             <p:ph type="title"/>
@@ -4959,7 +4955,7 @@
       </p:sp>
       <p:sp>
         <p:nvSpPr>
-          <p:cNvPr id="200" name="Queries over ONDEX paths, Virtuoso"/>
+          <p:cNvPr id="199" name="Queries over ONDEX paths, Virtuoso"/>
           <p:cNvSpPr txBox="1"/>
           <p:nvPr/>
         </p:nvSpPr>
@@ -4995,7 +4991,7 @@
       </p:sp>
       <p:pic>
         <p:nvPicPr>
-          <p:cNvPr id="201" name="Image" descr="Image"/>
+          <p:cNvPr id="200" name="Image" descr="Image"/>
           <p:cNvPicPr>
             <a:picLocks noChangeAspect="1"/>
           </p:cNvPicPr>
@@ -5032,7 +5028,7 @@
 </file>
 
 <file path=ppt/slides/slide15.xml><?xml version="1.0" encoding="utf-8"?>
-<p:sld xmlns:a="http://schemas.openxmlformats.org/drawingml/2006/main" xmlns:r="http://schemas.openxmlformats.org/officeDocument/2006/relationships" xmlns:p="http://schemas.openxmlformats.org/presentationml/2006/main" showMasterSp="1" showMasterPhAnim="1">
+<p:sld xmlns:a="http://schemas.openxmlformats.org/drawingml/2006/main" xmlns:r="http://schemas.openxmlformats.org/officeDocument/2006/relationships" xmlns:p="http://schemas.openxmlformats.org/presentationml/2006/main" xmlns:m="http://schemas.openxmlformats.org/officeDocument/2006/math" xmlns:a14="http://schemas.microsoft.com/office/drawing/2010/main" showMasterSp="1" showMasterPhAnim="1">
   <p:cSld>
     <p:spTree>
       <p:nvGrpSpPr>
@@ -5050,7 +5046,7 @@
       </p:grpSpPr>
       <p:sp>
         <p:nvSpPr>
-          <p:cNvPr id="203" name="neo4j"/>
+          <p:cNvPr id="202" name="neo4j"/>
           <p:cNvSpPr txBox="1"/>
           <p:nvPr>
             <p:ph type="title"/>
@@ -5082,7 +5078,7 @@
 </file>
 
 <file path=ppt/slides/slide16.xml><?xml version="1.0" encoding="utf-8"?>
-<p:sld xmlns:a="http://schemas.openxmlformats.org/drawingml/2006/main" xmlns:r="http://schemas.openxmlformats.org/officeDocument/2006/relationships" xmlns:p="http://schemas.openxmlformats.org/presentationml/2006/main" showMasterSp="1" showMasterPhAnim="1">
+<p:sld xmlns:a="http://schemas.openxmlformats.org/drawingml/2006/main" xmlns:r="http://schemas.openxmlformats.org/officeDocument/2006/relationships" xmlns:p="http://schemas.openxmlformats.org/presentationml/2006/main" xmlns:m="http://schemas.openxmlformats.org/officeDocument/2006/math" xmlns:a14="http://schemas.microsoft.com/office/drawing/2010/main" showMasterSp="1" showMasterPhAnim="1">
   <p:cSld>
     <p:spTree>
       <p:nvGrpSpPr>
@@ -5100,7 +5096,7 @@
       </p:grpSpPr>
       <p:sp>
         <p:nvSpPr>
-          <p:cNvPr id="205" name="Neo4j Essentials"/>
+          <p:cNvPr id="204" name="Neo4j Essentials"/>
           <p:cNvSpPr txBox="1"/>
           <p:nvPr>
             <p:ph type="title"/>
@@ -5128,7 +5124,7 @@
       </p:sp>
       <p:sp>
         <p:nvSpPr>
-          <p:cNvPr id="206" name="Designed to backup applications…"/>
+          <p:cNvPr id="205" name="Designed to backup applications…"/>
           <p:cNvSpPr txBox="1"/>
           <p:nvPr>
             <p:ph type="body" idx="1"/>
@@ -5271,7 +5267,7 @@
       </p:sp>
       <p:sp>
         <p:nvSpPr>
-          <p:cNvPr id="207" name="Image credits: https://goo.gl/YLhCXG"/>
+          <p:cNvPr id="206" name="Image credits: https://goo.gl/YLhCXG"/>
           <p:cNvSpPr txBox="1"/>
           <p:nvPr/>
         </p:nvSpPr>
@@ -5316,7 +5312,7 @@
       </p:sp>
       <p:pic>
         <p:nvPicPr>
-          <p:cNvPr id="208" name="graphdb_model.jpg" descr="graphdb_model.jpg"/>
+          <p:cNvPr id="207" name="graphdb_model.jpg" descr="graphdb_model.jpg"/>
           <p:cNvPicPr>
             <a:picLocks noChangeAspect="1"/>
           </p:cNvPicPr>
@@ -5354,7 +5350,7 @@
 </file>
 
 <file path=ppt/slides/slide17.xml><?xml version="1.0" encoding="utf-8"?>
-<p:sld xmlns:a="http://schemas.openxmlformats.org/drawingml/2006/main" xmlns:r="http://schemas.openxmlformats.org/officeDocument/2006/relationships" xmlns:p="http://schemas.openxmlformats.org/presentationml/2006/main" showMasterSp="1" showMasterPhAnim="1">
+<p:sld xmlns:a="http://schemas.openxmlformats.org/drawingml/2006/main" xmlns:r="http://schemas.openxmlformats.org/officeDocument/2006/relationships" xmlns:p="http://schemas.openxmlformats.org/presentationml/2006/main" xmlns:m="http://schemas.openxmlformats.org/officeDocument/2006/math" xmlns:a14="http://schemas.microsoft.com/office/drawing/2010/main" showMasterSp="1" showMasterPhAnim="1">
   <p:cSld>
     <p:spTree>
       <p:nvGrpSpPr>
@@ -5372,7 +5368,7 @@
       </p:grpSpPr>
       <p:sp>
         <p:nvSpPr>
-          <p:cNvPr id="210" name="Neo4j Data Model"/>
+          <p:cNvPr id="209" name="Neo4j Data Model"/>
           <p:cNvSpPr txBox="1"/>
           <p:nvPr>
             <p:ph type="body" idx="14"/>
@@ -5404,7 +5400,7 @@
       </p:sp>
       <p:pic>
         <p:nvPicPr>
-          <p:cNvPr id="211" name="neo4j_graph.png" descr="neo4j_graph.png"/>
+          <p:cNvPr id="210" name="neo4j_graph.png" descr="neo4j_graph.png"/>
           <p:cNvPicPr>
             <a:picLocks noChangeAspect="1"/>
           </p:cNvPicPr>
@@ -5434,7 +5430,7 @@
       </p:pic>
       <p:sp>
         <p:nvSpPr>
-          <p:cNvPr id="212" name="Text"/>
+          <p:cNvPr id="211" name="Text"/>
           <p:cNvSpPr txBox="1"/>
           <p:nvPr/>
         </p:nvSpPr>
@@ -5462,7 +5458,7 @@
       </p:sp>
       <p:sp>
         <p:nvSpPr>
-          <p:cNvPr id="213" name="Both nodes and relations can have attributes"/>
+          <p:cNvPr id="212" name="Both nodes and relations can have attributes"/>
           <p:cNvSpPr txBox="1"/>
           <p:nvPr/>
         </p:nvSpPr>
@@ -5513,7 +5509,7 @@
       </p:sp>
       <p:sp>
         <p:nvSpPr>
-          <p:cNvPr id="214" name="Nodes &amp; relations have labels  (i.e., string-based types)"/>
+          <p:cNvPr id="213" name="Nodes &amp; relations have labels  (i.e., string-based types)"/>
           <p:cNvSpPr txBox="1"/>
           <p:nvPr/>
         </p:nvSpPr>
@@ -5566,7 +5562,7 @@
       </p:sp>
       <p:sp>
         <p:nvSpPr>
-          <p:cNvPr id="215" name="Cool management interface (SPARQL version might be a student project)"/>
+          <p:cNvPr id="214" name="Cool management interface (SPARQL version might be a student project)"/>
           <p:cNvSpPr txBox="1"/>
           <p:nvPr/>
         </p:nvSpPr>
@@ -5627,7 +5623,7 @@
 </file>
 
 <file path=ppt/slides/slide18.xml><?xml version="1.0" encoding="utf-8"?>
-<p:sld xmlns:a="http://schemas.openxmlformats.org/drawingml/2006/main" xmlns:r="http://schemas.openxmlformats.org/officeDocument/2006/relationships" xmlns:p="http://schemas.openxmlformats.org/presentationml/2006/main" showMasterSp="1" showMasterPhAnim="1">
+<p:sld xmlns:a="http://schemas.openxmlformats.org/drawingml/2006/main" xmlns:r="http://schemas.openxmlformats.org/officeDocument/2006/relationships" xmlns:p="http://schemas.openxmlformats.org/presentationml/2006/main" xmlns:m="http://schemas.openxmlformats.org/officeDocument/2006/math" xmlns:a14="http://schemas.microsoft.com/office/drawing/2010/main" showMasterSp="1" showMasterPhAnim="1">
   <p:cSld>
     <p:spTree>
       <p:nvGrpSpPr>
@@ -5645,7 +5641,7 @@
       </p:grpSpPr>
       <p:sp>
         <p:nvSpPr>
-          <p:cNvPr id="217" name="Cypher Query/DM Language"/>
+          <p:cNvPr id="216" name="Cypher Query/DM Language"/>
           <p:cNvSpPr txBox="1"/>
           <p:nvPr>
             <p:ph type="body" idx="14"/>
@@ -5677,7 +5673,7 @@
       </p:sp>
       <p:sp>
         <p:nvSpPr>
-          <p:cNvPr id="218" name="Proteins-&gt;Reactions-&gt;Pathways: // chain of paths, node selection via property (exploits indices) MATCH (prot:Protein) - [csby:consumed_by] -&gt; (:Reaction) - [:part_of] -&gt; (pway:Path{ title: ‘apoptosis’ }) // further conditions, but often not performant WHERE prot.name =~ ‘(?i)^DNA.+’ // Usual projection and post-selection operators RETURN prot.name, pway // Relations can have properties ORDER BY csby.pvalue LIMIT 1000"/>
+          <p:cNvPr id="217" name="Proteins-&gt;Reactions-&gt;Pathways: // chain of paths, node selection via property (exploits indices) MATCH (prot:Protein) - [csby:consumed_by] -&gt; (:Reaction) - [:part_of] -&gt; (pway:Path{ title: ‘apoptosis’ }) // further conditions, but often not performant WHERE prot.name =~ ‘(?i)^DNA.+’ // Usual projection and post-selection operators RETURN prot.name, pway // Relations can have properties ORDER BY csby.pvalue LIMIT 1000"/>
           <p:cNvSpPr txBox="1"/>
           <p:nvPr/>
         </p:nvSpPr>
@@ -5763,7 +5759,7 @@
       </p:sp>
       <p:sp>
         <p:nvSpPr>
-          <p:cNvPr id="219" name="Single-path (or same-direction branching) easy to write: MATCH (prot:Protein) - [:pd_by|cs_by] -&gt; (:Reaction) - [:part_of*1..3] -&gt; (pway:Path) RETURN ID(prot), ID(pway) LIMIT 1000 // Very compact forms available, depending on the data MATCH (prot:Protein) - (pway:Path) RETURN pway"/>
+          <p:cNvPr id="218" name="Single-path (or same-direction branching) easy to write: MATCH (prot:Protein) - [:pd_by|cs_by] -&gt; (:Reaction) - [:part_of*1..3] -&gt; (pway:Path) RETURN ID(prot), ID(pway) LIMIT 1000 // Very compact forms available, depending on the data MATCH (prot:Protein) - (pway:Path) RETURN pway"/>
           <p:cNvSpPr txBox="1"/>
           <p:nvPr/>
         </p:nvSpPr>
@@ -5837,7 +5833,7 @@
 </file>
 
 <file path=ppt/slides/slide19.xml><?xml version="1.0" encoding="utf-8"?>
-<p:sld xmlns:a="http://schemas.openxmlformats.org/drawingml/2006/main" xmlns:r="http://schemas.openxmlformats.org/officeDocument/2006/relationships" xmlns:p="http://schemas.openxmlformats.org/presentationml/2006/main" showMasterSp="1" showMasterPhAnim="1">
+<p:sld xmlns:a="http://schemas.openxmlformats.org/drawingml/2006/main" xmlns:r="http://schemas.openxmlformats.org/officeDocument/2006/relationships" xmlns:p="http://schemas.openxmlformats.org/presentationml/2006/main" xmlns:m="http://schemas.openxmlformats.org/officeDocument/2006/math" xmlns:a14="http://schemas.microsoft.com/office/drawing/2010/main" showMasterSp="1" showMasterPhAnim="1">
   <p:cSld>
     <p:spTree>
       <p:nvGrpSpPr>
@@ -5855,7 +5851,7 @@
       </p:grpSpPr>
       <p:sp>
         <p:nvSpPr>
-          <p:cNvPr id="221" name="Cypher Query/DM Language"/>
+          <p:cNvPr id="220" name="Cypher Query/DM Language"/>
           <p:cNvSpPr txBox="1"/>
           <p:nvPr>
             <p:ph type="body" idx="14"/>
@@ -5887,7 +5883,7 @@
       </p:sp>
       <p:sp>
         <p:nvSpPr>
-          <p:cNvPr id="222" name="DML features: MATCH (prot:Protein{ name:’P53’ }), (pway:Path{ title:’apoptosis’}) CREATE (prot) - [:participates_in] -&gt; (pway)"/>
+          <p:cNvPr id="221" name="DML features: MATCH (prot:Protein{ name:’P53’ }), (pway:Path{ title:’apoptosis’}) CREATE (prot) - [:participates_in] -&gt; (pway)"/>
           <p:cNvSpPr txBox="1"/>
           <p:nvPr/>
         </p:nvSpPr>
@@ -5946,7 +5942,7 @@
       </p:sp>
       <p:sp>
         <p:nvSpPr>
-          <p:cNvPr id="223" name="DML features, embeddable in Java/Python/etc: UNWIND $rows AS row // $rows set by the invoker, programmatically MATCH (prot:Protein{ id: row.protId }), (pway:Path{ id:row.pathId }) CREATE (prot) - [relation:participates_in] -&gt; (pway) SET relation = row.relationAttributes"/>
+          <p:cNvPr id="222" name="DML features, embeddable in Java/Python/etc: UNWIND $rows AS row // $rows set by the invoker, programmatically MATCH (prot:Protein{ id: row.protId }), (pway:Path{ id:row.pathId }) CREATE (prot) - [relation:participates_in] -&gt; (pway) SET relation = row.relationAttributes"/>
           <p:cNvSpPr txBox="1"/>
           <p:nvPr/>
         </p:nvSpPr>
@@ -6020,7 +6016,7 @@
 </file>
 
 <file path=ppt/slides/slide2.xml><?xml version="1.0" encoding="utf-8"?>
-<p:sld xmlns:a="http://schemas.openxmlformats.org/drawingml/2006/main" xmlns:r="http://schemas.openxmlformats.org/officeDocument/2006/relationships" xmlns:p="http://schemas.openxmlformats.org/presentationml/2006/main" showMasterSp="1" showMasterPhAnim="1">
+<p:sld xmlns:a="http://schemas.openxmlformats.org/drawingml/2006/main" xmlns:r="http://schemas.openxmlformats.org/officeDocument/2006/relationships" xmlns:p="http://schemas.openxmlformats.org/presentationml/2006/main" xmlns:m="http://schemas.openxmlformats.org/officeDocument/2006/math" xmlns:a14="http://schemas.microsoft.com/office/drawing/2010/main" showMasterSp="1" showMasterPhAnim="1">
   <p:cSld>
     <p:spTree>
       <p:nvGrpSpPr>
@@ -6247,7 +6243,7 @@
 </file>
 
 <file path=ppt/slides/slide20.xml><?xml version="1.0" encoding="utf-8"?>
-<p:sld xmlns:a="http://schemas.openxmlformats.org/drawingml/2006/main" xmlns:r="http://schemas.openxmlformats.org/officeDocument/2006/relationships" xmlns:p="http://schemas.openxmlformats.org/presentationml/2006/main" showMasterSp="1" showMasterPhAnim="1">
+<p:sld xmlns:a="http://schemas.openxmlformats.org/drawingml/2006/main" xmlns:r="http://schemas.openxmlformats.org/officeDocument/2006/relationships" xmlns:p="http://schemas.openxmlformats.org/presentationml/2006/main" xmlns:m="http://schemas.openxmlformats.org/officeDocument/2006/math" xmlns:a14="http://schemas.microsoft.com/office/drawing/2010/main" showMasterSp="1" showMasterPhAnim="1">
   <p:cSld>
     <p:spTree>
       <p:nvGrpSpPr>
@@ -6265,7 +6261,7 @@
       </p:grpSpPr>
       <p:sp>
         <p:nvSpPr>
-          <p:cNvPr id="225" name="Cypher/Neo4j Performance"/>
+          <p:cNvPr id="224" name="Cypher/Neo4j Performance"/>
           <p:cNvSpPr txBox="1"/>
           <p:nvPr>
             <p:ph type="title"/>
@@ -6293,7 +6289,7 @@
       </p:sp>
       <p:sp>
         <p:nvSpPr>
-          <p:cNvPr id="226" name="Simple, common queries"/>
+          <p:cNvPr id="225" name="Simple, common queries"/>
           <p:cNvSpPr txBox="1"/>
           <p:nvPr/>
         </p:nvSpPr>
@@ -6329,7 +6325,7 @@
       </p:sp>
       <p:pic>
         <p:nvPicPr>
-          <p:cNvPr id="227" name="Image" descr="Image"/>
+          <p:cNvPr id="226" name="Image" descr="Image"/>
           <p:cNvPicPr>
             <a:picLocks noChangeAspect="1"/>
           </p:cNvPicPr>
@@ -6366,7 +6362,7 @@
 </file>
 
 <file path=ppt/slides/slide21.xml><?xml version="1.0" encoding="utf-8"?>
-<p:sld xmlns:a="http://schemas.openxmlformats.org/drawingml/2006/main" xmlns:r="http://schemas.openxmlformats.org/officeDocument/2006/relationships" xmlns:p="http://schemas.openxmlformats.org/presentationml/2006/main" showMasterSp="1" showMasterPhAnim="1">
+<p:sld xmlns:a="http://schemas.openxmlformats.org/drawingml/2006/main" xmlns:r="http://schemas.openxmlformats.org/officeDocument/2006/relationships" xmlns:p="http://schemas.openxmlformats.org/presentationml/2006/main" xmlns:m="http://schemas.openxmlformats.org/officeDocument/2006/math" xmlns:a14="http://schemas.microsoft.com/office/drawing/2010/main" showMasterSp="1" showMasterPhAnim="1">
   <p:cSld>
     <p:spTree>
       <p:nvGrpSpPr>
@@ -6384,7 +6380,7 @@
       </p:grpSpPr>
       <p:sp>
         <p:nvSpPr>
-          <p:cNvPr id="229" name="Cypher/Neo4j Performance"/>
+          <p:cNvPr id="228" name="Cypher/Neo4j Performance"/>
           <p:cNvSpPr txBox="1"/>
           <p:nvPr>
             <p:ph type="title"/>
@@ -6408,7 +6404,7 @@
       </p:sp>
       <p:sp>
         <p:nvSpPr>
-          <p:cNvPr id="230" name="Path Queries"/>
+          <p:cNvPr id="229" name="Path Queries"/>
           <p:cNvSpPr txBox="1"/>
           <p:nvPr/>
         </p:nvSpPr>
@@ -6444,7 +6440,7 @@
       </p:sp>
       <p:pic>
         <p:nvPicPr>
-          <p:cNvPr id="231" name="Image" descr="Image"/>
+          <p:cNvPr id="230" name="Image" descr="Image"/>
           <p:cNvPicPr>
             <a:picLocks noChangeAspect="1"/>
           </p:cNvPicPr>
@@ -6481,7 +6477,7 @@
 </file>
 
 <file path=ppt/slides/slide22.xml><?xml version="1.0" encoding="utf-8"?>
-<p:sld xmlns:a="http://schemas.openxmlformats.org/drawingml/2006/main" xmlns:r="http://schemas.openxmlformats.org/officeDocument/2006/relationships" xmlns:p="http://schemas.openxmlformats.org/presentationml/2006/main" showMasterSp="1" showMasterPhAnim="1">
+<p:sld xmlns:a="http://schemas.openxmlformats.org/drawingml/2006/main" xmlns:r="http://schemas.openxmlformats.org/officeDocument/2006/relationships" xmlns:p="http://schemas.openxmlformats.org/presentationml/2006/main" xmlns:m="http://schemas.openxmlformats.org/officeDocument/2006/math" xmlns:a14="http://schemas.microsoft.com/office/drawing/2010/main" showMasterSp="1" showMasterPhAnim="1">
   <p:cSld>
     <p:spTree>
       <p:nvGrpSpPr>
@@ -6499,7 +6495,7 @@
       </p:grpSpPr>
       <p:sp>
         <p:nvSpPr>
-          <p:cNvPr id="233" name="Sounds Good, But…"/>
+          <p:cNvPr id="232" name="Sounds Good, But…"/>
           <p:cNvSpPr txBox="1"/>
           <p:nvPr>
             <p:ph type="body" idx="14"/>
@@ -6531,7 +6527,7 @@
       </p:sp>
       <p:sp>
         <p:nvSpPr>
-          <p:cNvPr id="234" name="select distinct ?prot ?pway { where {     # Branch 1     …   } union {      # Branch 2      …      {          # Branch 2.1      }       union {        # Branch 2.2     }      …  } }"/>
+          <p:cNvPr id="233" name="select distinct ?prot ?pway { where {     # Branch 1     …   } union {      # Branch 2      …      {          # Branch 2.1      }       union {        # Branch 2.2     }      …  } }"/>
           <p:cNvSpPr txBox="1"/>
           <p:nvPr/>
         </p:nvSpPr>
@@ -6709,7 +6705,7 @@
       </p:sp>
       <p:grpSp>
         <p:nvGrpSpPr>
-          <p:cNvPr id="237" name="Group"/>
+          <p:cNvPr id="236" name="Group"/>
           <p:cNvGrpSpPr/>
           <p:nvPr/>
         </p:nvGrpSpPr>
@@ -6723,7 +6719,7 @@
         </p:grpSpPr>
         <p:sp>
           <p:nvSpPr>
-            <p:cNvPr id="235" name="Rounded Rectangle"/>
+            <p:cNvPr id="234" name="Rounded Rectangle"/>
             <p:cNvSpPr/>
             <p:nvPr/>
           </p:nvSpPr>
@@ -6765,7 +6761,7 @@
         </p:sp>
         <p:pic>
           <p:nvPicPr>
-            <p:cNvPr id="236" name="ara_knet_pattern.png" descr="ara_knet_pattern.png"/>
+            <p:cNvPr id="235" name="ara_knet_pattern.png" descr="ara_knet_pattern.png"/>
             <p:cNvPicPr>
               <a:picLocks noChangeAspect="1"/>
             </p:cNvPicPr>
@@ -6797,7 +6793,7 @@
       </p:grpSp>
       <p:sp>
         <p:nvSpPr>
-          <p:cNvPr id="238" name="In Cypher?!…"/>
+          <p:cNvPr id="237" name="In Cypher?!…"/>
           <p:cNvSpPr txBox="1"/>
           <p:nvPr>
             <p:ph type="body" sz="half" idx="4294967295"/>
@@ -6869,7 +6865,7 @@
       </p:sp>
       <p:sp>
         <p:nvSpPr>
-          <p:cNvPr id="239" name="MATCH (prot:Protein) &lt;- [:ac_by] - (:Enzyme) &lt;- [:ca_by] - (:Transport) &lt;- [:part_of] - (pway:Path) RETURN prot, pway LIMIT 100 UNION MATCH (prot:Protein) - [:is_a] -&gt; (:Enzyme) &lt;- [:ca_by] - (:Transport) &lt;- [:part_of] - (pway:Path) RETURN prot, pway LIMIT 100"/>
+          <p:cNvPr id="238" name="MATCH (prot:Protein) &lt;- [:ac_by] - (:Enzyme) &lt;- [:ca_by] - (:Transport) &lt;- [:part_of] - (pway:Path) RETURN prot, pway LIMIT 100 UNION MATCH (prot:Protein) - [:is_a] -&gt; (:Enzyme) &lt;- [:ca_by] - (:Transport) &lt;- [:part_of] - (pway:Path) RETURN prot, pway LIMIT 100"/>
           <p:cNvSpPr txBox="1"/>
           <p:nvPr/>
         </p:nvSpPr>
@@ -6934,7 +6930,7 @@
 </file>
 
 <file path=ppt/slides/slide23.xml><?xml version="1.0" encoding="utf-8"?>
-<p:sld xmlns:a="http://schemas.openxmlformats.org/drawingml/2006/main" xmlns:r="http://schemas.openxmlformats.org/officeDocument/2006/relationships" xmlns:p="http://schemas.openxmlformats.org/presentationml/2006/main" showMasterSp="1" showMasterPhAnim="1">
+<p:sld xmlns:a="http://schemas.openxmlformats.org/drawingml/2006/main" xmlns:r="http://schemas.openxmlformats.org/officeDocument/2006/relationships" xmlns:p="http://schemas.openxmlformats.org/presentationml/2006/main" xmlns:m="http://schemas.openxmlformats.org/officeDocument/2006/math" xmlns:a14="http://schemas.microsoft.com/office/drawing/2010/main" showMasterSp="1" showMasterPhAnim="1">
   <p:cSld>
     <p:spTree>
       <p:nvGrpSpPr>
@@ -6952,7 +6948,7 @@
       </p:grpSpPr>
       <p:sp>
         <p:nvSpPr>
-          <p:cNvPr id="241" name="ADDENDUM"/>
+          <p:cNvPr id="240" name="ADDENDUM"/>
           <p:cNvSpPr txBox="1"/>
           <p:nvPr>
             <p:ph type="body" idx="14"/>
@@ -6984,7 +6980,7 @@
       </p:sp>
       <p:sp>
         <p:nvSpPr>
-          <p:cNvPr id="242" name="select distinct ?prot ?pway { where {     # Branch 1     …   } union {      # Branch 2      …      {          # Branch 2.1      }       union {        # Branch 2.2     }      …  } }"/>
+          <p:cNvPr id="241" name="select distinct ?prot ?pway { where {     # Branch 1     …   } union {      # Branch 2      …      {          # Branch 2.1      }       union {        # Branch 2.2     }      …  } }"/>
           <p:cNvSpPr txBox="1"/>
           <p:nvPr/>
         </p:nvSpPr>
@@ -7162,7 +7158,7 @@
       </p:sp>
       <p:grpSp>
         <p:nvGrpSpPr>
-          <p:cNvPr id="245" name="Group"/>
+          <p:cNvPr id="244" name="Group"/>
           <p:cNvGrpSpPr/>
           <p:nvPr/>
         </p:nvGrpSpPr>
@@ -7176,7 +7172,7 @@
         </p:grpSpPr>
         <p:sp>
           <p:nvSpPr>
-            <p:cNvPr id="243" name="Rounded Rectangle"/>
+            <p:cNvPr id="242" name="Rounded Rectangle"/>
             <p:cNvSpPr/>
             <p:nvPr/>
           </p:nvSpPr>
@@ -7218,7 +7214,7 @@
         </p:sp>
         <p:pic>
           <p:nvPicPr>
-            <p:cNvPr id="244" name="ara_knet_pattern.png" descr="ara_knet_pattern.png"/>
+            <p:cNvPr id="243" name="ara_knet_pattern.png" descr="ara_knet_pattern.png"/>
             <p:cNvPicPr>
               <a:picLocks noChangeAspect="1"/>
             </p:cNvPicPr>
@@ -7250,7 +7246,7 @@
       </p:grpSp>
       <p:sp>
         <p:nvSpPr>
-          <p:cNvPr id="246" name="In Cypher?! Unions+branches partially possible by means of paths in WHERE:"/>
+          <p:cNvPr id="245" name="In Cypher?! Unions+branches partially possible by means of paths in WHERE:"/>
           <p:cNvSpPr txBox="1"/>
           <p:nvPr>
             <p:ph type="body" sz="quarter" idx="4294967295"/>
@@ -7296,7 +7292,7 @@
       </p:sp>
       <p:sp>
         <p:nvSpPr>
-          <p:cNvPr id="247" name="// Branch 2 MATCH (prot:Protein), (enz:Enzyme), (tns:Transport) - [:part_of] -&gt; (path:Path) WHERE (    (enz) - [:ac_by|:in_by] -&gt; (:Comp) - [:pd_by|:cs_by] -&gt; (tns) // Branch 2.1     OR (tns) - [:ca_by] -&gt; (enz) )                                                           //Branch 2.2 (pt1)            AND ( (prot) - [:is_a] -&gt; (enz) OR (prot) &lt;- [:ac_by] - (enz) ) // Branch 2.2 (pt2) RETURN prot, path LIMIT 30 UNION  // Branch1 MATCH (prot:Protein) - [:pd_by|:cs_by] -&gt; (:Reaction) - [:part_of] -&gt; (path:Path) RETURN prot, path LIMIT 30"/>
+          <p:cNvPr id="246" name="// Branch 2 MATCH (prot:Protein), (enz:Enzyme), (tns:Transport) - [:part_of] -&gt; (path:Path) WHERE (    (enz) - [:ac_by|:in_by] -&gt; (:Comp) - [:pd_by|:cs_by] -&gt; (tns) // Branch 2.1     OR (tns) - [:ca_by] -&gt; (enz) )                                                           //Branch 2.2 (pt1)            AND ( (prot) - [:is_a] -&gt; (enz) OR (prot) &lt;- [:ac_by] - (enz) ) // Branch 2.2 (pt2) RETURN prot, path LIMIT 30 UNION  // Branch1 MATCH (prot:Protein) - [:pd_by|:cs_by] -&gt; (:Reaction) - [:part_of] -&gt; (path:Path) RETURN prot, path LIMIT 30"/>
           <p:cNvSpPr txBox="1"/>
           <p:nvPr/>
         </p:nvSpPr>
@@ -7429,7 +7425,7 @@
       </p:sp>
       <p:sp>
         <p:nvSpPr>
-          <p:cNvPr id="248" name="However,…"/>
+          <p:cNvPr id="247" name="However,…"/>
           <p:cNvSpPr txBox="1"/>
           <p:nvPr/>
         </p:nvSpPr>
@@ -7511,7 +7507,7 @@
 </file>
 
 <file path=ppt/slides/slide24.xml><?xml version="1.0" encoding="utf-8"?>
-<p:sld xmlns:a="http://schemas.openxmlformats.org/drawingml/2006/main" xmlns:r="http://schemas.openxmlformats.org/officeDocument/2006/relationships" xmlns:p="http://schemas.openxmlformats.org/presentationml/2006/main" showMasterSp="1" showMasterPhAnim="1">
+<p:sld xmlns:a="http://schemas.openxmlformats.org/drawingml/2006/main" xmlns:r="http://schemas.openxmlformats.org/officeDocument/2006/relationships" xmlns:p="http://schemas.openxmlformats.org/presentationml/2006/main" xmlns:m="http://schemas.openxmlformats.org/officeDocument/2006/math" xmlns:a14="http://schemas.microsoft.com/office/drawing/2010/main" showMasterSp="1" showMasterPhAnim="1">
   <p:cSld>
     <p:spTree>
       <p:nvGrpSpPr>
@@ -7529,7 +7525,7 @@
       </p:grpSpPr>
       <p:sp>
         <p:nvSpPr>
-          <p:cNvPr id="250" name="Sounds Good, But…"/>
+          <p:cNvPr id="249" name="Sounds Good, But…"/>
           <p:cNvSpPr txBox="1"/>
           <p:nvPr>
             <p:ph type="body" idx="14"/>
@@ -7561,7 +7557,7 @@
       </p:sp>
       <p:sp>
         <p:nvSpPr>
-          <p:cNvPr id="251" name="What about schemas/metadata/ontologies?…"/>
+          <p:cNvPr id="250" name="What about schemas/metadata/ontologies?…"/>
           <p:cNvSpPr txBox="1"/>
           <p:nvPr>
             <p:ph type="body" idx="4294967295"/>
@@ -7641,7 +7637,7 @@
 </file>
 
 <file path=ppt/slides/slide25.xml><?xml version="1.0" encoding="utf-8"?>
-<p:sld xmlns:a="http://schemas.openxmlformats.org/drawingml/2006/main" xmlns:r="http://schemas.openxmlformats.org/officeDocument/2006/relationships" xmlns:p="http://schemas.openxmlformats.org/presentationml/2006/main" showMasterSp="1" showMasterPhAnim="1">
+<p:sld xmlns:a="http://schemas.openxmlformats.org/drawingml/2006/main" xmlns:r="http://schemas.openxmlformats.org/officeDocument/2006/relationships" xmlns:p="http://schemas.openxmlformats.org/presentationml/2006/main" xmlns:m="http://schemas.openxmlformats.org/officeDocument/2006/math" xmlns:a14="http://schemas.microsoft.com/office/drawing/2010/main" showMasterSp="1" showMasterPhAnim="1">
   <p:cSld>
     <p:spTree>
       <p:nvGrpSpPr>
@@ -7659,7 +7655,7 @@
       </p:grpSpPr>
       <p:sp>
         <p:nvSpPr>
-          <p:cNvPr id="253" name="Sounds Good, But…"/>
+          <p:cNvPr id="252" name="Sounds Good, But…"/>
           <p:cNvSpPr txBox="1"/>
           <p:nvPr>
             <p:ph type="body" idx="14"/>
@@ -7691,7 +7687,7 @@
       </p:sp>
       <p:sp>
         <p:nvSpPr>
-          <p:cNvPr id="254" name="Basically, it’s relational-oriented about schemas…"/>
+          <p:cNvPr id="253" name="Basically, it’s relational-oriented about schemas…"/>
           <p:cNvSpPr txBox="1"/>
           <p:nvPr>
             <p:ph type="body" idx="4294967295"/>
@@ -7847,7 +7843,7 @@
 </file>
 
 <file path=ppt/slides/slide26.xml><?xml version="1.0" encoding="utf-8"?>
-<p:sld xmlns:a="http://schemas.openxmlformats.org/drawingml/2006/main" xmlns:r="http://schemas.openxmlformats.org/officeDocument/2006/relationships" xmlns:p="http://schemas.openxmlformats.org/presentationml/2006/main" showMasterSp="1" showMasterPhAnim="1">
+<p:sld xmlns:a="http://schemas.openxmlformats.org/drawingml/2006/main" xmlns:r="http://schemas.openxmlformats.org/officeDocument/2006/relationships" xmlns:p="http://schemas.openxmlformats.org/presentationml/2006/main" xmlns:m="http://schemas.openxmlformats.org/officeDocument/2006/math" xmlns:a14="http://schemas.microsoft.com/office/drawing/2010/main" showMasterSp="1" showMasterPhAnim="1">
   <p:cSld>
     <p:spTree>
       <p:nvGrpSpPr>
@@ -7865,7 +7861,7 @@
       </p:grpSpPr>
       <p:sp>
         <p:nvSpPr>
-          <p:cNvPr id="256" name="Flat, RDF-Like Model"/>
+          <p:cNvPr id="255" name="Flat, RDF-Like Model"/>
           <p:cNvSpPr txBox="1"/>
           <p:nvPr>
             <p:ph type="body" idx="14"/>
@@ -7897,7 +7893,7 @@
       </p:sp>
       <p:pic>
         <p:nvPicPr>
-          <p:cNvPr id="257" name="no4j_flat_model.png" descr="no4j_flat_model.png"/>
+          <p:cNvPr id="256" name="no4j_flat_model.png" descr="no4j_flat_model.png"/>
           <p:cNvPicPr>
             <a:picLocks noChangeAspect="1"/>
           </p:cNvPicPr>
@@ -7927,7 +7923,7 @@
       </p:pic>
       <p:sp>
         <p:nvSpPr>
-          <p:cNvPr id="258" name="Code for both converters: github:/marco-brandizi/odx_neo4j_converter_test"/>
+          <p:cNvPr id="257" name="Code for both converters: github:/marco-brandizi/odx_neo4j_converter_test"/>
           <p:cNvSpPr txBox="1"/>
           <p:nvPr/>
         </p:nvSpPr>
@@ -7988,7 +7984,7 @@
 </file>
 
 <file path=ppt/slides/slide27.xml><?xml version="1.0" encoding="utf-8"?>
-<p:sld xmlns:a="http://schemas.openxmlformats.org/drawingml/2006/main" xmlns:r="http://schemas.openxmlformats.org/officeDocument/2006/relationships" xmlns:p="http://schemas.openxmlformats.org/presentationml/2006/main" showMasterSp="1" showMasterPhAnim="1">
+<p:sld xmlns:a="http://schemas.openxmlformats.org/drawingml/2006/main" xmlns:r="http://schemas.openxmlformats.org/officeDocument/2006/relationships" xmlns:p="http://schemas.openxmlformats.org/presentationml/2006/main" xmlns:m="http://schemas.openxmlformats.org/officeDocument/2006/math" xmlns:a14="http://schemas.microsoft.com/office/drawing/2010/main" showMasterSp="1" showMasterPhAnim="1">
   <p:cSld>
     <p:spTree>
       <p:nvGrpSpPr>
@@ -8006,7 +8002,7 @@
       </p:grpSpPr>
       <p:sp>
         <p:nvSpPr>
-          <p:cNvPr id="260" name="Flat Model Impact on Cypher"/>
+          <p:cNvPr id="259" name="Flat Model Impact on Cypher"/>
           <p:cNvSpPr txBox="1"/>
           <p:nvPr>
             <p:ph type="body" idx="14"/>
@@ -8038,7 +8034,7 @@
       </p:sp>
       <p:sp>
         <p:nvSpPr>
-          <p:cNvPr id="261" name="Structured model: MATCH (prot:Protein{ id: '250169' }) - [:cs_by] -&gt; (react:Reaction) - [:part_of] -&gt; (pway:Path) RETURN * LIMIT 100"/>
+          <p:cNvPr id="260" name="Structured model: MATCH (prot:Protein{ id: '250169' }) - [:cs_by] -&gt; (react:Reaction) - [:part_of] -&gt; (pway:Path) RETURN * LIMIT 100"/>
           <p:cNvSpPr txBox="1"/>
           <p:nvPr/>
         </p:nvSpPr>
@@ -8096,7 +8092,7 @@
       </p:sp>
       <p:sp>
         <p:nvSpPr>
-          <p:cNvPr id="262" name="Flat model: MATCH (prot:Concept {id: '250169', ccName: 'Protein'})  &lt;- [:from] - (csby:Relation {name: 'cs_by' })  - [:to] -&gt; (react:Concept { ccName: 'Reaction'})  &lt;- [:from] - (partof:Relation {name:'part_of'}) - [:to]  -&gt; (pway:Concept {ccName:'Path'}) RETURN * LIMIT 100"/>
+          <p:cNvPr id="261" name="Flat model: MATCH (prot:Concept {id: '250169', ccName: 'Protein'})  &lt;- [:from] - (csby:Relation {name: 'cs_by' })  - [:to] -&gt; (react:Concept { ccName: 'Reaction'})  &lt;- [:from] - (partof:Relation {name:'part_of'}) - [:to]  -&gt; (pway:Concept {ccName:'Path'}) RETURN * LIMIT 100"/>
           <p:cNvSpPr txBox="1"/>
           <p:nvPr/>
         </p:nvSpPr>
@@ -8170,7 +8166,7 @@
       </p:sp>
       <p:sp>
         <p:nvSpPr>
-          <p:cNvPr id="263" name="Rich schema-based queries MATCH (mol:{Concept}) &lt;- [:conceptClass] - (cc:ConceptClass),   (cc) &lt;- [:specializationOf*] - (:ConceptClass{name:’Protein’}"/>
+          <p:cNvPr id="262" name="Rich schema-based queries MATCH (mol:{Concept}) &lt;- [:conceptClass] - (cc:ConceptClass),   (cc) &lt;- [:specializationOf*] - (:ConceptClass{name:’Protein’}"/>
           <p:cNvSpPr txBox="1"/>
           <p:nvPr/>
         </p:nvSpPr>
@@ -8243,7 +8239,7 @@
 </file>
 
 <file path=ppt/slides/slide28.xml><?xml version="1.0" encoding="utf-8"?>
-<p:sld xmlns:a="http://schemas.openxmlformats.org/drawingml/2006/main" xmlns:r="http://schemas.openxmlformats.org/officeDocument/2006/relationships" xmlns:p="http://schemas.openxmlformats.org/presentationml/2006/main" showMasterSp="1" showMasterPhAnim="1">
+<p:sld xmlns:a="http://schemas.openxmlformats.org/drawingml/2006/main" xmlns:r="http://schemas.openxmlformats.org/officeDocument/2006/relationships" xmlns:p="http://schemas.openxmlformats.org/presentationml/2006/main" xmlns:m="http://schemas.openxmlformats.org/officeDocument/2006/math" xmlns:a14="http://schemas.microsoft.com/office/drawing/2010/main" showMasterSp="1" showMasterPhAnim="1">
   <p:cSld>
     <p:spTree>
       <p:nvGrpSpPr>
@@ -8261,7 +8257,7 @@
       </p:grpSpPr>
       <p:sp>
         <p:nvSpPr>
-          <p:cNvPr id="265" name="Flat Model Performance"/>
+          <p:cNvPr id="264" name="Flat Model Performance"/>
           <p:cNvSpPr txBox="1"/>
           <p:nvPr>
             <p:ph type="title"/>
@@ -8285,7 +8281,7 @@
       </p:sp>
       <p:sp>
         <p:nvSpPr>
-          <p:cNvPr id="266" name="Simple, common queries"/>
+          <p:cNvPr id="265" name="Simple, common queries"/>
           <p:cNvSpPr txBox="1"/>
           <p:nvPr/>
         </p:nvSpPr>
@@ -8321,7 +8317,7 @@
       </p:sp>
       <p:pic>
         <p:nvPicPr>
-          <p:cNvPr id="267" name="Image" descr="Image"/>
+          <p:cNvPr id="266" name="Image" descr="Image"/>
           <p:cNvPicPr>
             <a:picLocks noChangeAspect="1"/>
           </p:cNvPicPr>
@@ -8358,7 +8354,7 @@
 </file>
 
 <file path=ppt/slides/slide29.xml><?xml version="1.0" encoding="utf-8"?>
-<p:sld xmlns:a="http://schemas.openxmlformats.org/drawingml/2006/main" xmlns:r="http://schemas.openxmlformats.org/officeDocument/2006/relationships" xmlns:p="http://schemas.openxmlformats.org/presentationml/2006/main" showMasterSp="1" showMasterPhAnim="1">
+<p:sld xmlns:a="http://schemas.openxmlformats.org/drawingml/2006/main" xmlns:r="http://schemas.openxmlformats.org/officeDocument/2006/relationships" xmlns:p="http://schemas.openxmlformats.org/presentationml/2006/main" xmlns:m="http://schemas.openxmlformats.org/officeDocument/2006/math" xmlns:a14="http://schemas.microsoft.com/office/drawing/2010/main" showMasterSp="1" showMasterPhAnim="1">
   <p:cSld>
     <p:spTree>
       <p:nvGrpSpPr>
@@ -8376,7 +8372,7 @@
       </p:grpSpPr>
       <p:sp>
         <p:nvSpPr>
-          <p:cNvPr id="269" name="Flat Model Performance"/>
+          <p:cNvPr id="268" name="Flat Model Performance"/>
           <p:cNvSpPr txBox="1"/>
           <p:nvPr>
             <p:ph type="title"/>
@@ -8404,7 +8400,7 @@
       </p:sp>
       <p:sp>
         <p:nvSpPr>
-          <p:cNvPr id="270" name="Typical ONDEX Graph Queries"/>
+          <p:cNvPr id="269" name="Typical ONDEX Graph Queries"/>
           <p:cNvSpPr txBox="1"/>
           <p:nvPr/>
         </p:nvSpPr>
@@ -8440,7 +8436,7 @@
       </p:sp>
       <p:pic>
         <p:nvPicPr>
-          <p:cNvPr id="271" name="Image" descr="Image"/>
+          <p:cNvPr id="270" name="Image" descr="Image"/>
           <p:cNvPicPr>
             <a:picLocks noChangeAspect="1"/>
           </p:cNvPicPr>
@@ -8477,7 +8473,7 @@
 </file>
 
 <file path=ppt/slides/slide3.xml><?xml version="1.0" encoding="utf-8"?>
-<p:sld xmlns:a="http://schemas.openxmlformats.org/drawingml/2006/main" xmlns:r="http://schemas.openxmlformats.org/officeDocument/2006/relationships" xmlns:p="http://schemas.openxmlformats.org/presentationml/2006/main" showMasterSp="1" showMasterPhAnim="1">
+<p:sld xmlns:a="http://schemas.openxmlformats.org/drawingml/2006/main" xmlns:r="http://schemas.openxmlformats.org/officeDocument/2006/relationships" xmlns:p="http://schemas.openxmlformats.org/presentationml/2006/main" xmlns:m="http://schemas.openxmlformats.org/officeDocument/2006/math" xmlns:a14="http://schemas.microsoft.com/office/drawing/2010/main" showMasterSp="1" showMasterPhAnim="1">
   <p:cSld>
     <p:spTree>
       <p:nvGrpSpPr>
@@ -8724,7 +8720,7 @@
                       <a:miter lim="400000"/>
                     </a:lnB>
                     <a:blipFill rotWithShape="1">
-                      <a:blip r:embed="rId2"/>
+                      <a:blip r:embed="rId3"/>
                       <a:srcRect l="0" t="0" r="0" b="0"/>
                       <a:tile tx="0" ty="0" sx="100000" sy="100000" flip="none" algn="tl"/>
                     </a:blipFill>
@@ -8851,7 +8847,7 @@
                       <a:miter lim="400000"/>
                     </a:lnB>
                     <a:blipFill rotWithShape="1">
-                      <a:blip r:embed="rId2"/>
+                      <a:blip r:embed="rId4"/>
                       <a:srcRect l="0" t="0" r="0" b="0"/>
                       <a:tile tx="0" ty="0" sx="100000" sy="100000" flip="none" algn="tl"/>
                     </a:blipFill>
@@ -8978,7 +8974,7 @@
                       <a:miter lim="400000"/>
                     </a:lnB>
                     <a:blipFill rotWithShape="1">
-                      <a:blip r:embed="rId2"/>
+                      <a:blip r:embed="rId5"/>
                       <a:srcRect l="0" t="0" r="0" b="0"/>
                       <a:tile tx="0" ty="0" sx="100000" sy="100000" flip="none" algn="tl"/>
                     </a:blipFill>
@@ -9063,7 +9059,7 @@
 </file>
 
 <file path=ppt/slides/slide30.xml><?xml version="1.0" encoding="utf-8"?>
-<p:sld xmlns:a="http://schemas.openxmlformats.org/drawingml/2006/main" xmlns:r="http://schemas.openxmlformats.org/officeDocument/2006/relationships" xmlns:p="http://schemas.openxmlformats.org/presentationml/2006/main" showMasterSp="1" showMasterPhAnim="1">
+<p:sld xmlns:a="http://schemas.openxmlformats.org/drawingml/2006/main" xmlns:r="http://schemas.openxmlformats.org/officeDocument/2006/relationships" xmlns:p="http://schemas.openxmlformats.org/presentationml/2006/main" xmlns:m="http://schemas.openxmlformats.org/officeDocument/2006/math" xmlns:a14="http://schemas.microsoft.com/office/drawing/2010/main" showMasterSp="1" showMasterPhAnim="1">
   <p:cSld>
     <p:spTree>
       <p:nvGrpSpPr>
@@ -9081,7 +9077,7 @@
       </p:grpSpPr>
       <p:sp>
         <p:nvSpPr>
-          <p:cNvPr id="273" name="Impact on Cypher"/>
+          <p:cNvPr id="272" name="Impact on Cypher"/>
           <p:cNvSpPr txBox="1"/>
           <p:nvPr>
             <p:ph type="body" idx="14"/>
@@ -9113,7 +9109,7 @@
       </p:sp>
       <p:sp>
         <p:nvSpPr>
-          <p:cNvPr id="274" name="Rich schema-based queries From: MATCH (molecule:Molecule), (molType:Class)-[:is_a*]-&gt;(:Class{ name:’Protein’ }) WHERE molType.label IN LABELS (molecule)  To: MATCH (mol:{Concept}) &lt;- [:conceptClass] - (cc:ConceptClass),   (cc) &lt;- [:specializationOf*] - (:ConceptClass{name:’Protein’}…"/>
+          <p:cNvPr id="273" name="Rich schema-based queries From: MATCH (molecule:Molecule), (molType:Class)-[:is_a*]-&gt;(:Class{ name:’Protein’ }) WHERE molType.label IN LABELS (molecule)  To: MATCH (mol:{Concept}) &lt;- [:conceptClass] - (cc:ConceptClass),   (cc) &lt;- [:specializationOf*] - (:ConceptClass{name:’Protein’}…"/>
           <p:cNvSpPr txBox="1"/>
           <p:nvPr/>
         </p:nvSpPr>
@@ -9230,7 +9226,7 @@
 </file>
 
 <file path=ppt/slides/slide31.xml><?xml version="1.0" encoding="utf-8"?>
-<p:sld xmlns:a="http://schemas.openxmlformats.org/drawingml/2006/main" xmlns:r="http://schemas.openxmlformats.org/officeDocument/2006/relationships" xmlns:p="http://schemas.openxmlformats.org/presentationml/2006/main" showMasterSp="1" showMasterPhAnim="1">
+<p:sld xmlns:a="http://schemas.openxmlformats.org/drawingml/2006/main" xmlns:r="http://schemas.openxmlformats.org/officeDocument/2006/relationships" xmlns:p="http://schemas.openxmlformats.org/presentationml/2006/main" xmlns:m="http://schemas.openxmlformats.org/officeDocument/2006/math" xmlns:a14="http://schemas.microsoft.com/office/drawing/2010/main" showMasterSp="1" showMasterPhAnim="1">
   <p:cSld>
     <p:spTree>
       <p:nvGrpSpPr>
@@ -9248,7 +9244,7 @@
       </p:grpSpPr>
       <p:sp>
         <p:nvSpPr>
-          <p:cNvPr id="276" name="Impact on Cypher"/>
+          <p:cNvPr id="275" name="Impact on Cypher"/>
           <p:cNvSpPr txBox="1"/>
           <p:nvPr>
             <p:ph type="body" idx="14"/>
@@ -9280,7 +9276,7 @@
       </p:sp>
       <p:sp>
         <p:nvSpPr>
-          <p:cNvPr id="277" name="Rich schema-based queries MATCH (mol:{Concept}) &lt;- [:conceptClass] - (cc:ConceptClass),   (cc) &lt;- [:specializationOf*] - (:ConceptClass{name:’Protein’}…"/>
+          <p:cNvPr id="276" name="Rich schema-based queries MATCH (mol:{Concept}) &lt;- [:conceptClass] - (cc:ConceptClass),   (cc) &lt;- [:specializationOf*] - (:ConceptClass{name:’Protein’}…"/>
           <p:cNvSpPr txBox="1"/>
           <p:nvPr/>
         </p:nvSpPr>
@@ -9537,7 +9533,7 @@
 </file>
 
 <file path=ppt/slides/slide32.xml><?xml version="1.0" encoding="utf-8"?>
-<p:sld xmlns:a="http://schemas.openxmlformats.org/drawingml/2006/main" xmlns:r="http://schemas.openxmlformats.org/officeDocument/2006/relationships" xmlns:p="http://schemas.openxmlformats.org/presentationml/2006/main" showMasterSp="1" showMasterPhAnim="1">
+<p:sld xmlns:a="http://schemas.openxmlformats.org/drawingml/2006/main" xmlns:r="http://schemas.openxmlformats.org/officeDocument/2006/relationships" xmlns:p="http://schemas.openxmlformats.org/presentationml/2006/main" xmlns:m="http://schemas.openxmlformats.org/officeDocument/2006/math" xmlns:a14="http://schemas.microsoft.com/office/drawing/2010/main" showMasterSp="1" showMasterPhAnim="1">
   <p:cSld>
     <p:spTree>
       <p:nvGrpSpPr>
@@ -9555,7 +9551,7 @@
       </p:grpSpPr>
       <p:sp>
         <p:nvSpPr>
-          <p:cNvPr id="279" name="Other Issues"/>
+          <p:cNvPr id="278" name="Other Issues"/>
           <p:cNvSpPr txBox="1"/>
           <p:nvPr>
             <p:ph type="title"/>
@@ -9583,7 +9579,7 @@
       </p:sp>
       <p:sp>
         <p:nvSpPr>
-          <p:cNvPr id="280" name="Data Exchange format?…"/>
+          <p:cNvPr id="279" name="Data Exchange format?…"/>
           <p:cNvSpPr txBox="1"/>
           <p:nvPr>
             <p:ph type="body" idx="1"/>
@@ -9769,7 +9765,7 @@
       </p:sp>
       <p:sp>
         <p:nvSpPr>
-          <p:cNvPr id="281" name="Image credits: https://goo.gl/ysBFF2"/>
+          <p:cNvPr id="280" name="Image credits: https://goo.gl/ysBFF2"/>
           <p:cNvSpPr txBox="1"/>
           <p:nvPr/>
         </p:nvSpPr>
@@ -9818,7 +9814,7 @@
       </p:sp>
       <p:pic>
         <p:nvPicPr>
-          <p:cNvPr id="282" name="tinkerpop.jpg" descr="tinkerpop.jpg"/>
+          <p:cNvPr id="281" name="tinkerpop.jpg" descr="tinkerpop.jpg"/>
           <p:cNvPicPr>
             <a:picLocks noChangeAspect="1"/>
           </p:cNvPicPr>
@@ -9855,7 +9851,7 @@
 </file>
 
 <file path=ppt/slides/slide33.xml><?xml version="1.0" encoding="utf-8"?>
-<p:sld xmlns:a="http://schemas.openxmlformats.org/drawingml/2006/main" xmlns:r="http://schemas.openxmlformats.org/officeDocument/2006/relationships" xmlns:p="http://schemas.openxmlformats.org/presentationml/2006/main" showMasterSp="1" showMasterPhAnim="1">
+<p:sld xmlns:a="http://schemas.openxmlformats.org/drawingml/2006/main" xmlns:r="http://schemas.openxmlformats.org/officeDocument/2006/relationships" xmlns:p="http://schemas.openxmlformats.org/presentationml/2006/main" xmlns:m="http://schemas.openxmlformats.org/officeDocument/2006/math" xmlns:a14="http://schemas.microsoft.com/office/drawing/2010/main" showMasterSp="1" showMasterPhAnim="1">
   <p:cSld>
     <p:spTree>
       <p:nvGrpSpPr>
@@ -9873,7 +9869,7 @@
       </p:grpSpPr>
       <p:sp>
         <p:nvSpPr>
-          <p:cNvPr id="284" name="Conclusions"/>
+          <p:cNvPr id="283" name="Conclusions"/>
           <p:cNvSpPr txBox="1"/>
           <p:nvPr>
             <p:ph type="title"/>
@@ -9901,7 +9897,7 @@
       </p:sp>
       <p:graphicFrame>
         <p:nvGraphicFramePr>
-          <p:cNvPr id="285" name="Table"/>
+          <p:cNvPr id="284" name="Table"/>
           <p:cNvGraphicFramePr/>
           <p:nvPr/>
         </p:nvGraphicFramePr>
@@ -10331,7 +10327,7 @@
                       <a:miter lim="400000"/>
                     </a:lnB>
                     <a:blipFill rotWithShape="1">
-                      <a:blip r:embed="rId2"/>
+                      <a:blip r:embed="rId3"/>
                       <a:srcRect l="0" t="0" r="0" b="0"/>
                       <a:tile tx="0" ty="0" sx="100000" sy="100000" flip="none" algn="tl"/>
                     </a:blipFill>
@@ -10524,7 +10520,7 @@
                       <a:miter lim="400000"/>
                     </a:lnB>
                     <a:blipFill rotWithShape="1">
-                      <a:blip r:embed="rId2"/>
+                      <a:blip r:embed="rId4"/>
                       <a:srcRect l="0" t="0" r="0" b="0"/>
                       <a:tile tx="0" ty="0" sx="100000" sy="100000" flip="none" algn="tl"/>
                     </a:blipFill>
@@ -10715,7 +10711,7 @@
                       <a:miter lim="400000"/>
                     </a:lnB>
                     <a:blipFill rotWithShape="1">
-                      <a:blip r:embed="rId2"/>
+                      <a:blip r:embed="rId5"/>
                       <a:srcRect l="0" t="0" r="0" b="0"/>
                       <a:tile tx="0" ty="0" sx="100000" sy="100000" flip="none" algn="tl"/>
                     </a:blipFill>
@@ -10909,7 +10905,7 @@
                       <a:miter lim="400000"/>
                     </a:lnB>
                     <a:blipFill rotWithShape="1">
-                      <a:blip r:embed="rId2"/>
+                      <a:blip r:embed="rId6"/>
                       <a:srcRect l="0" t="0" r="0" b="0"/>
                       <a:tile tx="0" ty="0" sx="100000" sy="100000" flip="none" algn="tl"/>
                     </a:blipFill>
@@ -11099,7 +11095,7 @@
                       <a:miter lim="400000"/>
                     </a:lnB>
                     <a:blipFill rotWithShape="1">
-                      <a:blip r:embed="rId2"/>
+                      <a:blip r:embed="rId7"/>
                       <a:srcRect l="0" t="0" r="0" b="0"/>
                       <a:tile tx="0" ty="0" sx="100000" sy="100000" flip="none" algn="tl"/>
                     </a:blipFill>
@@ -11244,7 +11240,7 @@
 </file>
 
 <file path=ppt/slides/slide34.xml><?xml version="1.0" encoding="utf-8"?>
-<p:sld xmlns:a="http://schemas.openxmlformats.org/drawingml/2006/main" xmlns:r="http://schemas.openxmlformats.org/officeDocument/2006/relationships" xmlns:p="http://schemas.openxmlformats.org/presentationml/2006/main" showMasterSp="1" showMasterPhAnim="1">
+<p:sld xmlns:a="http://schemas.openxmlformats.org/drawingml/2006/main" xmlns:r="http://schemas.openxmlformats.org/officeDocument/2006/relationships" xmlns:p="http://schemas.openxmlformats.org/presentationml/2006/main" xmlns:m="http://schemas.openxmlformats.org/officeDocument/2006/math" xmlns:a14="http://schemas.microsoft.com/office/drawing/2010/main" showMasterSp="1" showMasterPhAnim="1">
   <p:cSld>
     <p:spTree>
       <p:nvGrpSpPr>
@@ -11262,7 +11258,7 @@
       </p:grpSpPr>
       <p:sp>
         <p:nvSpPr>
-          <p:cNvPr id="287" name="Conclusions"/>
+          <p:cNvPr id="286" name="Conclusions"/>
           <p:cNvSpPr txBox="1"/>
           <p:nvPr>
             <p:ph type="title"/>
@@ -11290,7 +11286,7 @@
       </p:sp>
       <p:pic>
         <p:nvPicPr>
-          <p:cNvPr id="288" name="conclusions_backend.png" descr="conclusions_backend.png"/>
+          <p:cNvPr id="287" name="conclusions_backend.png" descr="conclusions_backend.png"/>
           <p:cNvPicPr>
             <a:picLocks noChangeAspect="1"/>
           </p:cNvPicPr>
@@ -11327,7 +11323,7 @@
 </file>
 
 <file path=ppt/slides/slide35.xml><?xml version="1.0" encoding="utf-8"?>
-<p:sld xmlns:a="http://schemas.openxmlformats.org/drawingml/2006/main" xmlns:r="http://schemas.openxmlformats.org/officeDocument/2006/relationships" xmlns:p="http://schemas.openxmlformats.org/presentationml/2006/main" showMasterSp="1" showMasterPhAnim="1">
+<p:sld xmlns:a="http://schemas.openxmlformats.org/drawingml/2006/main" xmlns:r="http://schemas.openxmlformats.org/officeDocument/2006/relationships" xmlns:p="http://schemas.openxmlformats.org/presentationml/2006/main" xmlns:m="http://schemas.openxmlformats.org/officeDocument/2006/math" xmlns:a14="http://schemas.microsoft.com/office/drawing/2010/main" showMasterSp="1" showMasterPhAnim="1">
   <p:cSld>
     <p:spTree>
       <p:nvGrpSpPr>
@@ -11345,7 +11341,7 @@
       </p:grpSpPr>
       <p:sp>
         <p:nvSpPr>
-          <p:cNvPr id="290" name="Conclusions"/>
+          <p:cNvPr id="289" name="Conclusions"/>
           <p:cNvSpPr txBox="1"/>
           <p:nvPr>
             <p:ph type="title"/>
@@ -11373,7 +11369,7 @@
       </p:sp>
       <p:pic>
         <p:nvPicPr>
-          <p:cNvPr id="291" name="conclusions_format.png" descr="conclusions_format.png"/>
+          <p:cNvPr id="290" name="conclusions_format.png" descr="conclusions_format.png"/>
           <p:cNvPicPr>
             <a:picLocks noChangeAspect="1"/>
           </p:cNvPicPr>
@@ -11417,7 +11413,7 @@
 </file>
 
 <file path=ppt/slides/slide36.xml><?xml version="1.0" encoding="utf-8"?>
-<p:sld xmlns:a="http://schemas.openxmlformats.org/drawingml/2006/main" xmlns:r="http://schemas.openxmlformats.org/officeDocument/2006/relationships" xmlns:p="http://schemas.openxmlformats.org/presentationml/2006/main" showMasterSp="1" showMasterPhAnim="1">
+<p:sld xmlns:a="http://schemas.openxmlformats.org/drawingml/2006/main" xmlns:r="http://schemas.openxmlformats.org/officeDocument/2006/relationships" xmlns:p="http://schemas.openxmlformats.org/presentationml/2006/main" xmlns:m="http://schemas.openxmlformats.org/officeDocument/2006/math" xmlns:a14="http://schemas.microsoft.com/office/drawing/2010/main" showMasterSp="1" showMasterPhAnim="1">
   <p:cSld>
     <p:spTree>
       <p:nvGrpSpPr>
@@ -11435,7 +11431,7 @@
       </p:grpSpPr>
       <p:sp>
         <p:nvSpPr>
-          <p:cNvPr id="293" name="Conclusions"/>
+          <p:cNvPr id="292" name="Conclusions"/>
           <p:cNvSpPr txBox="1"/>
           <p:nvPr>
             <p:ph type="title"/>
@@ -11463,7 +11459,7 @@
       </p:sp>
       <p:pic>
         <p:nvPicPr>
-          <p:cNvPr id="294" name="conclusions_store.png" descr="conclusions_store.png"/>
+          <p:cNvPr id="293" name="conclusions_store.png" descr="conclusions_store.png"/>
           <p:cNvPicPr>
             <a:picLocks noChangeAspect="1"/>
           </p:cNvPicPr>
@@ -11507,7 +11503,7 @@
 </file>
 
 <file path=ppt/slides/slide37.xml><?xml version="1.0" encoding="utf-8"?>
-<p:sld xmlns:a="http://schemas.openxmlformats.org/drawingml/2006/main" xmlns:r="http://schemas.openxmlformats.org/officeDocument/2006/relationships" xmlns:p="http://schemas.openxmlformats.org/presentationml/2006/main" showMasterSp="1" showMasterPhAnim="1">
+<p:sld xmlns:a="http://schemas.openxmlformats.org/drawingml/2006/main" xmlns:r="http://schemas.openxmlformats.org/officeDocument/2006/relationships" xmlns:p="http://schemas.openxmlformats.org/presentationml/2006/main" xmlns:m="http://schemas.openxmlformats.org/officeDocument/2006/math" xmlns:a14="http://schemas.microsoft.com/office/drawing/2010/main" showMasterSp="1" showMasterPhAnim="1">
   <p:cSld>
     <p:spTree>
       <p:nvGrpSpPr>
@@ -11525,7 +11521,7 @@
       </p:grpSpPr>
       <p:sp>
         <p:nvSpPr>
-          <p:cNvPr id="296" name="Why?"/>
+          <p:cNvPr id="295" name="Why?"/>
           <p:cNvSpPr txBox="1"/>
           <p:nvPr>
             <p:ph type="title"/>
@@ -11553,7 +11549,7 @@
       </p:sp>
       <p:sp>
         <p:nvSpPr>
-          <p:cNvPr id="297" name="Graph + APIs…"/>
+          <p:cNvPr id="296" name="Graph + APIs…"/>
           <p:cNvSpPr txBox="1"/>
           <p:nvPr>
             <p:ph type="body" idx="1"/>
@@ -11652,7 +11648,7 @@
       </p:sp>
       <p:grpSp>
         <p:nvGrpSpPr>
-          <p:cNvPr id="301" name="Group"/>
+          <p:cNvPr id="300" name="Group"/>
           <p:cNvGrpSpPr/>
           <p:nvPr/>
         </p:nvGrpSpPr>
@@ -11666,7 +11662,7 @@
         </p:grpSpPr>
         <p:pic>
           <p:nvPicPr>
-            <p:cNvPr id="298" name="conclusions_format.png" descr="conclusions_format.png"/>
+            <p:cNvPr id="297" name="conclusions_format.png" descr="conclusions_format.png"/>
             <p:cNvPicPr>
               <a:picLocks noChangeAspect="1"/>
             </p:cNvPicPr>
@@ -11703,7 +11699,7 @@
         </p:pic>
         <p:pic>
           <p:nvPicPr>
-            <p:cNvPr id="299" name="conclusions_store.png" descr="conclusions_store.png"/>
+            <p:cNvPr id="298" name="conclusions_store.png" descr="conclusions_store.png"/>
             <p:cNvPicPr>
               <a:picLocks noChangeAspect="1"/>
             </p:cNvPicPr>
@@ -11740,7 +11736,7 @@
         </p:pic>
         <p:pic>
           <p:nvPicPr>
-            <p:cNvPr id="300" name="conclusions_backend.png" descr="conclusions_backend.png"/>
+            <p:cNvPr id="299" name="conclusions_backend.png" descr="conclusions_backend.png"/>
             <p:cNvPicPr>
               <a:picLocks noChangeAspect="1"/>
             </p:cNvPicPr>
@@ -11780,7 +11776,7 @@
 </file>
 
 <file path=ppt/slides/slide38.xml><?xml version="1.0" encoding="utf-8"?>
-<p:sld xmlns:a="http://schemas.openxmlformats.org/drawingml/2006/main" xmlns:r="http://schemas.openxmlformats.org/officeDocument/2006/relationships" xmlns:p="http://schemas.openxmlformats.org/presentationml/2006/main" showMasterSp="1" showMasterPhAnim="1">
+<p:sld xmlns:a="http://schemas.openxmlformats.org/drawingml/2006/main" xmlns:r="http://schemas.openxmlformats.org/officeDocument/2006/relationships" xmlns:p="http://schemas.openxmlformats.org/presentationml/2006/main" xmlns:m="http://schemas.openxmlformats.org/officeDocument/2006/math" xmlns:a14="http://schemas.microsoft.com/office/drawing/2010/main" showMasterSp="1" showMasterPhAnim="1">
   <p:cSld>
     <p:spTree>
       <p:nvGrpSpPr>
@@ -11798,7 +11794,7 @@
       </p:grpSpPr>
       <p:sp>
         <p:nvSpPr>
-          <p:cNvPr id="303" name="Conclusions"/>
+          <p:cNvPr id="302" name="Conclusions"/>
           <p:cNvSpPr txBox="1"/>
           <p:nvPr>
             <p:ph type="title"/>
@@ -11826,7 +11822,7 @@
       </p:sp>
       <p:pic>
         <p:nvPicPr>
-          <p:cNvPr id="304" name="conclusions_format.png" descr="conclusions_format.png"/>
+          <p:cNvPr id="303" name="conclusions_format.png" descr="conclusions_format.png"/>
           <p:cNvPicPr>
             <a:picLocks noChangeAspect="1"/>
           </p:cNvPicPr>
@@ -11862,7 +11858,7 @@
       </p:pic>
       <p:pic>
         <p:nvPicPr>
-          <p:cNvPr id="305" name="conclusions_store.png" descr="conclusions_store.png"/>
+          <p:cNvPr id="304" name="conclusions_store.png" descr="conclusions_store.png"/>
           <p:cNvPicPr>
             <a:picLocks noChangeAspect="1"/>
           </p:cNvPicPr>
@@ -11898,7 +11894,7 @@
       </p:pic>
       <p:pic>
         <p:nvPicPr>
-          <p:cNvPr id="306" name="conclusions_backend.png" descr="conclusions_backend.png"/>
+          <p:cNvPr id="305" name="conclusions_backend.png" descr="conclusions_backend.png"/>
           <p:cNvPicPr>
             <a:picLocks noChangeAspect="1"/>
           </p:cNvPicPr>
@@ -11935,7 +11931,7 @@
 </file>
 
 <file path=ppt/slides/slide4.xml><?xml version="1.0" encoding="utf-8"?>
-<p:sld xmlns:a="http://schemas.openxmlformats.org/drawingml/2006/main" xmlns:r="http://schemas.openxmlformats.org/officeDocument/2006/relationships" xmlns:p="http://schemas.openxmlformats.org/presentationml/2006/main" showMasterSp="1" showMasterPhAnim="1">
+<p:sld xmlns:a="http://schemas.openxmlformats.org/drawingml/2006/main" xmlns:r="http://schemas.openxmlformats.org/officeDocument/2006/relationships" xmlns:p="http://schemas.openxmlformats.org/presentationml/2006/main" xmlns:m="http://schemas.openxmlformats.org/officeDocument/2006/math" xmlns:a14="http://schemas.microsoft.com/office/drawing/2010/main" showMasterSp="1" showMasterPhAnim="1">
   <p:cSld>
     <p:spTree>
       <p:nvGrpSpPr>
@@ -11979,100 +11975,80 @@
           </a:p>
         </p:txBody>
       </p:sp>
-      <p:grpSp>
-        <p:nvGrpSpPr>
-          <p:cNvPr id="151" name="Group"/>
-          <p:cNvGrpSpPr/>
+      <p:sp>
+        <p:nvSpPr>
+          <p:cNvPr id="149" name="Rounded Rectangle"/>
+          <p:cNvSpPr/>
           <p:nvPr/>
-        </p:nvGrpSpPr>
-        <p:grpSpPr>
+        </p:nvSpPr>
+        <p:spPr>
           <a:xfrm>
-            <a:off x="434108" y="4664273"/>
-            <a:ext cx="23515785" cy="7346170"/>
-            <a:chOff x="0" y="0"/>
-            <a:chExt cx="23515783" cy="7346168"/>
+            <a:off x="570908" y="4664273"/>
+            <a:ext cx="23378985" cy="7161312"/>
           </a:xfrm>
-        </p:grpSpPr>
-        <p:sp>
-          <p:nvSpPr>
-            <p:cNvPr id="149" name="Rounded Rectangle"/>
-            <p:cNvSpPr/>
-            <p:nvPr/>
-          </p:nvSpPr>
-          <p:spPr>
-            <a:xfrm>
-              <a:off x="136800" y="0"/>
-              <a:ext cx="23378984" cy="7161311"/>
-            </a:xfrm>
-            <a:prstGeom prst="roundRect">
-              <a:avLst>
-                <a:gd name="adj" fmla="val 5135"/>
-              </a:avLst>
-            </a:prstGeom>
-            <a:solidFill>
-              <a:srgbClr val="FFFFFF"/>
-            </a:solidFill>
-            <a:ln w="12700" cap="flat">
-              <a:noFill/>
-              <a:miter lim="400000"/>
-            </a:ln>
-            <a:effectLst/>
-          </p:spPr>
-          <p:txBody>
-            <a:bodyPr wrap="square" lIns="30137" tIns="30137" rIns="30137" bIns="30137" numCol="1" anchor="ctr">
-              <a:noAutofit/>
-            </a:bodyPr>
-            <a:lstStyle/>
-            <a:p>
-              <a:pPr>
-                <a:defRPr cap="all" spc="512" sz="3200">
-                  <a:latin typeface="Avenir Medium"/>
-                  <a:ea typeface="Avenir Medium"/>
-                  <a:cs typeface="Avenir Medium"/>
-                  <a:sym typeface="Avenir Medium"/>
-                </a:defRPr>
-              </a:pPr>
-            </a:p>
-          </p:txBody>
-        </p:sp>
-        <p:pic>
-          <p:nvPicPr>
-            <p:cNvPr id="150" name="rdf_pipeline.png" descr="rdf_pipeline.png"/>
-            <p:cNvPicPr>
-              <a:picLocks noChangeAspect="1"/>
-            </p:cNvPicPr>
-            <p:nvPr/>
-          </p:nvPicPr>
-          <p:blipFill>
-            <a:blip r:embed="rId2">
-              <a:extLst/>
-            </a:blip>
-            <a:stretch>
-              <a:fillRect/>
-            </a:stretch>
-          </p:blipFill>
-          <p:spPr>
-            <a:xfrm>
-              <a:off x="0" y="184858"/>
-              <a:ext cx="23378984" cy="7161311"/>
-            </a:xfrm>
-            <a:prstGeom prst="rect">
-              <a:avLst/>
-            </a:prstGeom>
-            <a:ln w="25400" cap="flat">
-              <a:noFill/>
-              <a:miter lim="400000"/>
-            </a:ln>
-            <a:effectLst>
-              <a:outerShdw sx="100000" sy="100000" kx="0" ky="0" algn="b" rotWithShape="0" blurRad="355600" dist="177800" dir="5400000">
-                <a:srgbClr val="000000">
-                  <a:alpha val="70000"/>
-                </a:srgbClr>
-              </a:outerShdw>
-            </a:effectLst>
-          </p:spPr>
-        </p:pic>
-      </p:grpSp>
+          <a:prstGeom prst="roundRect">
+            <a:avLst>
+              <a:gd name="adj" fmla="val 5135"/>
+            </a:avLst>
+          </a:prstGeom>
+          <a:solidFill>
+            <a:srgbClr val="FFFFFF"/>
+          </a:solidFill>
+          <a:ln w="12700">
+            <a:miter lim="400000"/>
+          </a:ln>
+        </p:spPr>
+        <p:txBody>
+          <a:bodyPr lIns="30137" tIns="30137" rIns="30137" bIns="30137" anchor="ctr"/>
+          <a:lstStyle/>
+          <a:p>
+            <a:pPr>
+              <a:defRPr cap="all" spc="512" sz="3200">
+                <a:latin typeface="Avenir Medium"/>
+                <a:ea typeface="Avenir Medium"/>
+                <a:cs typeface="Avenir Medium"/>
+                <a:sym typeface="Avenir Medium"/>
+              </a:defRPr>
+            </a:pPr>
+          </a:p>
+        </p:txBody>
+      </p:sp>
+      <p:pic>
+        <p:nvPicPr>
+          <p:cNvPr id="150" name="rdf_pipeline.png" descr="rdf_pipeline.png"/>
+          <p:cNvPicPr>
+            <a:picLocks noChangeAspect="1"/>
+          </p:cNvPicPr>
+          <p:nvPr/>
+        </p:nvPicPr>
+        <p:blipFill>
+          <a:blip r:embed="rId2">
+            <a:extLst/>
+          </a:blip>
+          <a:stretch>
+            <a:fillRect/>
+          </a:stretch>
+        </p:blipFill>
+        <p:spPr>
+          <a:xfrm>
+            <a:off x="434108" y="4849131"/>
+            <a:ext cx="23378985" cy="7161312"/>
+          </a:xfrm>
+          <a:prstGeom prst="rect">
+            <a:avLst/>
+          </a:prstGeom>
+          <a:ln w="25400">
+            <a:miter lim="400000"/>
+          </a:ln>
+          <a:effectLst>
+            <a:outerShdw sx="100000" sy="100000" kx="0" ky="0" algn="b" rotWithShape="0" blurRad="355600" dist="177800" dir="5400000">
+              <a:srgbClr val="000000">
+                <a:alpha val="70000"/>
+              </a:srgbClr>
+            </a:outerShdw>
+          </a:effectLst>
+        </p:spPr>
+      </p:pic>
     </p:spTree>
   </p:cSld>
   <p:clrMapOvr>
@@ -12083,7 +12059,7 @@
 </file>
 
 <file path=ppt/slides/slide5.xml><?xml version="1.0" encoding="utf-8"?>
-<p:sld xmlns:a="http://schemas.openxmlformats.org/drawingml/2006/main" xmlns:r="http://schemas.openxmlformats.org/officeDocument/2006/relationships" xmlns:p="http://schemas.openxmlformats.org/presentationml/2006/main" showMasterSp="1" showMasterPhAnim="1">
+<p:sld xmlns:a="http://schemas.openxmlformats.org/drawingml/2006/main" xmlns:r="http://schemas.openxmlformats.org/officeDocument/2006/relationships" xmlns:p="http://schemas.openxmlformats.org/presentationml/2006/main" xmlns:m="http://schemas.openxmlformats.org/officeDocument/2006/math" xmlns:a14="http://schemas.microsoft.com/office/drawing/2010/main" showMasterSp="1" showMasterPhAnim="1">
   <p:cSld>
     <p:spTree>
       <p:nvGrpSpPr>
@@ -12101,7 +12077,7 @@
       </p:grpSpPr>
       <p:sp>
         <p:nvSpPr>
-          <p:cNvPr id="153" name="Test Settings (Neo4J)"/>
+          <p:cNvPr id="152" name="Test Settings (Neo4J)"/>
           <p:cNvSpPr txBox="1"/>
           <p:nvPr>
             <p:ph type="title"/>
@@ -12129,7 +12105,7 @@
       </p:sp>
       <p:grpSp>
         <p:nvGrpSpPr>
-          <p:cNvPr id="156" name="Group"/>
+          <p:cNvPr id="155" name="Group"/>
           <p:cNvGrpSpPr/>
           <p:nvPr/>
         </p:nvGrpSpPr>
@@ -12143,7 +12119,7 @@
         </p:grpSpPr>
         <p:sp>
           <p:nvSpPr>
-            <p:cNvPr id="154" name="Rounded Rectangle"/>
+            <p:cNvPr id="153" name="Rounded Rectangle"/>
             <p:cNvSpPr/>
             <p:nvPr/>
           </p:nvSpPr>
@@ -12185,7 +12161,7 @@
         </p:sp>
         <p:pic>
           <p:nvPicPr>
-            <p:cNvPr id="155" name="neo4j_pipeline.png" descr="neo4j_pipeline.png"/>
+            <p:cNvPr id="154" name="neo4j_pipeline.png" descr="neo4j_pipeline.png"/>
             <p:cNvPicPr>
               <a:picLocks noChangeAspect="1"/>
             </p:cNvPicPr>
@@ -12231,7 +12207,7 @@
 </file>
 
 <file path=ppt/slides/slide6.xml><?xml version="1.0" encoding="utf-8"?>
-<p:sld xmlns:a="http://schemas.openxmlformats.org/drawingml/2006/main" xmlns:r="http://schemas.openxmlformats.org/officeDocument/2006/relationships" xmlns:p="http://schemas.openxmlformats.org/presentationml/2006/main" showMasterSp="1" showMasterPhAnim="1">
+<p:sld xmlns:a="http://schemas.openxmlformats.org/drawingml/2006/main" xmlns:r="http://schemas.openxmlformats.org/officeDocument/2006/relationships" xmlns:p="http://schemas.openxmlformats.org/presentationml/2006/main" xmlns:m="http://schemas.openxmlformats.org/officeDocument/2006/math" xmlns:a14="http://schemas.microsoft.com/office/drawing/2010/main" showMasterSp="1" showMasterPhAnim="1">
   <p:cSld>
     <p:spTree>
       <p:nvGrpSpPr>
@@ -12249,7 +12225,7 @@
       </p:grpSpPr>
       <p:sp>
         <p:nvSpPr>
-          <p:cNvPr id="158" name="RDF"/>
+          <p:cNvPr id="157" name="RDF"/>
           <p:cNvSpPr txBox="1"/>
           <p:nvPr>
             <p:ph type="title"/>
@@ -12281,7 +12257,7 @@
 </file>
 
 <file path=ppt/slides/slide7.xml><?xml version="1.0" encoding="utf-8"?>
-<p:sld xmlns:a="http://schemas.openxmlformats.org/drawingml/2006/main" xmlns:r="http://schemas.openxmlformats.org/officeDocument/2006/relationships" xmlns:p="http://schemas.openxmlformats.org/presentationml/2006/main" showMasterSp="1" showMasterPhAnim="1">
+<p:sld xmlns:a="http://schemas.openxmlformats.org/drawingml/2006/main" xmlns:r="http://schemas.openxmlformats.org/officeDocument/2006/relationships" xmlns:p="http://schemas.openxmlformats.org/presentationml/2006/main" xmlns:m="http://schemas.openxmlformats.org/officeDocument/2006/math" xmlns:a14="http://schemas.microsoft.com/office/drawing/2010/main" showMasterSp="1" showMasterPhAnim="1">
   <p:cSld>
     <p:spTree>
       <p:nvGrpSpPr>
@@ -12299,7 +12275,7 @@
       </p:grpSpPr>
       <p:sp>
         <p:nvSpPr>
-          <p:cNvPr id="160" name="RDF/Linked Data Essentials"/>
+          <p:cNvPr id="159" name="RDF/Linked Data Essentials"/>
           <p:cNvSpPr txBox="1"/>
           <p:nvPr>
             <p:ph type="title"/>
@@ -12327,7 +12303,7 @@
       </p:sp>
       <p:sp>
         <p:nvSpPr>
-          <p:cNvPr id="161" name="Simple, Fine-Grained Data Model: Property/Value Pairs &amp; Typed Links…"/>
+          <p:cNvPr id="160" name="Simple, Fine-Grained Data Model: Property/Value Pairs &amp; Typed Links…"/>
           <p:cNvSpPr txBox="1"/>
           <p:nvPr>
             <p:ph type="body" sz="half" idx="1"/>
@@ -12404,7 +12380,7 @@
       </p:sp>
       <p:grpSp>
         <p:nvGrpSpPr>
-          <p:cNvPr id="164" name="Group"/>
+          <p:cNvPr id="163" name="Group"/>
           <p:cNvGrpSpPr/>
           <p:nvPr/>
         </p:nvGrpSpPr>
@@ -12418,7 +12394,7 @@
         </p:grpSpPr>
         <p:sp>
           <p:nvSpPr>
-            <p:cNvPr id="162" name="Rounded Rectangle"/>
+            <p:cNvPr id="161" name="Rounded Rectangle"/>
             <p:cNvSpPr/>
             <p:nvPr/>
           </p:nvSpPr>
@@ -12460,7 +12436,7 @@
         </p:sp>
         <p:pic>
           <p:nvPicPr>
-            <p:cNvPr id="163" name="Image" descr="Image"/>
+            <p:cNvPr id="162" name="Image" descr="Image"/>
             <p:cNvPicPr>
               <a:picLocks noChangeAspect="1"/>
             </p:cNvPicPr>
@@ -12500,7 +12476,7 @@
 </file>
 
 <file path=ppt/slides/slide8.xml><?xml version="1.0" encoding="utf-8"?>
-<p:sld xmlns:a="http://schemas.openxmlformats.org/drawingml/2006/main" xmlns:r="http://schemas.openxmlformats.org/officeDocument/2006/relationships" xmlns:p="http://schemas.openxmlformats.org/presentationml/2006/main" showMasterSp="1" showMasterPhAnim="1">
+<p:sld xmlns:a="http://schemas.openxmlformats.org/drawingml/2006/main" xmlns:r="http://schemas.openxmlformats.org/officeDocument/2006/relationships" xmlns:p="http://schemas.openxmlformats.org/presentationml/2006/main" xmlns:m="http://schemas.openxmlformats.org/officeDocument/2006/math" xmlns:a14="http://schemas.microsoft.com/office/drawing/2010/main" showMasterSp="1" showMasterPhAnim="1">
   <p:cSld>
     <p:spTree>
       <p:nvGrpSpPr>
@@ -12518,7 +12494,7 @@
       </p:grpSpPr>
       <p:sp>
         <p:nvSpPr>
-          <p:cNvPr id="166" name="RDF/Linked Data Essentials"/>
+          <p:cNvPr id="165" name="RDF/Linked Data Essentials"/>
           <p:cNvSpPr txBox="1"/>
           <p:nvPr>
             <p:ph type="title"/>
@@ -12546,7 +12522,7 @@
       </p:sp>
       <p:sp>
         <p:nvSpPr>
-          <p:cNvPr id="167" name="Integration as native citizen, strong emphasis on knowledge modelling, schemas, ontologies"/>
+          <p:cNvPr id="166" name="Integration as native citizen, strong emphasis on knowledge modelling, schemas, ontologies"/>
           <p:cNvSpPr txBox="1"/>
           <p:nvPr>
             <p:ph type="body" sz="quarter" idx="1"/>
@@ -12579,7 +12555,7 @@
       </p:sp>
       <p:grpSp>
         <p:nvGrpSpPr>
-          <p:cNvPr id="170" name="Group"/>
+          <p:cNvPr id="169" name="Group"/>
           <p:cNvGrpSpPr/>
           <p:nvPr/>
         </p:nvGrpSpPr>
@@ -12593,7 +12569,7 @@
         </p:grpSpPr>
         <p:sp>
           <p:nvSpPr>
-            <p:cNvPr id="168" name="Rounded Rectangle"/>
+            <p:cNvPr id="167" name="Rounded Rectangle"/>
             <p:cNvSpPr/>
             <p:nvPr/>
           </p:nvSpPr>
@@ -12635,7 +12611,7 @@
         </p:sp>
         <p:pic>
           <p:nvPicPr>
-            <p:cNvPr id="169" name="Image" descr="Image"/>
+            <p:cNvPr id="168" name="Image" descr="Image"/>
             <p:cNvPicPr>
               <a:picLocks noChangeAspect="1"/>
             </p:cNvPicPr>
@@ -12675,7 +12651,7 @@
 </file>
 
 <file path=ppt/slides/slide9.xml><?xml version="1.0" encoding="utf-8"?>
-<p:sld xmlns:a="http://schemas.openxmlformats.org/drawingml/2006/main" xmlns:r="http://schemas.openxmlformats.org/officeDocument/2006/relationships" xmlns:p="http://schemas.openxmlformats.org/presentationml/2006/main" showMasterSp="1" showMasterPhAnim="1">
+<p:sld xmlns:a="http://schemas.openxmlformats.org/drawingml/2006/main" xmlns:r="http://schemas.openxmlformats.org/officeDocument/2006/relationships" xmlns:p="http://schemas.openxmlformats.org/presentationml/2006/main" xmlns:m="http://schemas.openxmlformats.org/officeDocument/2006/math" xmlns:a14="http://schemas.microsoft.com/office/drawing/2010/main" showMasterSp="1" showMasterPhAnim="1">
   <p:cSld>
     <p:spTree>
       <p:nvGrpSpPr>
@@ -12693,7 +12669,7 @@
       </p:grpSpPr>
       <p:sp>
         <p:nvSpPr>
-          <p:cNvPr id="172" name="Rounded Rectangle"/>
+          <p:cNvPr id="171" name="Rounded Rectangle"/>
           <p:cNvSpPr/>
           <p:nvPr/>
         </p:nvSpPr>
@@ -12731,7 +12707,7 @@
       </p:sp>
       <p:sp>
         <p:nvSpPr>
-          <p:cNvPr id="173" name="Data MODEL: ONDEX in RDF"/>
+          <p:cNvPr id="172" name="Data MODEL: ONDEX in RDF"/>
           <p:cNvSpPr txBox="1"/>
           <p:nvPr>
             <p:ph type="body" idx="14"/>
@@ -12763,7 +12739,7 @@
       </p:sp>
       <p:pic>
         <p:nvPicPr>
-          <p:cNvPr id="174" name="rdf_data_model.png" descr="rdf_data_model.png"/>
+          <p:cNvPr id="173" name="rdf_data_model.png" descr="rdf_data_model.png"/>
           <p:cNvPicPr>
             <a:picLocks noChangeAspect="1"/>
           </p:cNvPicPr>

</xml_diff>